<commit_message>
trying to finalize prez
</commit_message>
<xml_diff>
--- a/event-loop/prez.pptx
+++ b/event-loop/prez.pptx
@@ -16,11 +16,12 @@
     <p:sldId id="266" r:id="rId10"/>
     <p:sldId id="270" r:id="rId11"/>
     <p:sldId id="257" r:id="rId12"/>
-    <p:sldId id="258" r:id="rId13"/>
-    <p:sldId id="263" r:id="rId14"/>
-    <p:sldId id="269" r:id="rId15"/>
-    <p:sldId id="272" r:id="rId16"/>
-    <p:sldId id="271" r:id="rId17"/>
+    <p:sldId id="273" r:id="rId13"/>
+    <p:sldId id="258" r:id="rId14"/>
+    <p:sldId id="263" r:id="rId15"/>
+    <p:sldId id="269" r:id="rId16"/>
+    <p:sldId id="272" r:id="rId17"/>
+    <p:sldId id="271" r:id="rId18"/>
   </p:sldIdLst>
   <p:sldSz cx="12192000" cy="6858000"/>
   <p:notesSz cx="6858000" cy="9144000"/>
@@ -4023,34 +4024,58 @@
               <a:t>	poll – </a:t>
             </a:r>
             <a:r>
-              <a:rPr lang="en-US" dirty="0" err="1"/>
+              <a:rPr lang="en-US" dirty="0" err="1">
+                <a:solidFill>
+                  <a:srgbClr val="FF0000"/>
+                </a:solidFill>
+              </a:rPr>
               <a:t>readFile</a:t>
             </a:r>
+            <a:endParaRPr lang="en-US" dirty="0">
+              <a:solidFill>
+                <a:srgbClr val="FF0000"/>
+              </a:solidFill>
+            </a:endParaRPr>
+          </a:p>
+          <a:p>
+            <a:r>
+              <a:rPr lang="en-US" dirty="0"/>
+              <a:t>	check – </a:t>
+            </a:r>
+            <a:r>
+              <a:rPr lang="en-US" dirty="0">
+                <a:solidFill>
+                  <a:srgbClr val="FF0000"/>
+                </a:solidFill>
+              </a:rPr>
+              <a:t>our immediate</a:t>
+            </a:r>
+          </a:p>
+          <a:p>
             <a:endParaRPr lang="en-US" dirty="0"/>
           </a:p>
           <a:p>
             <a:r>
+              <a:rPr lang="en-US" dirty="0">
+                <a:solidFill>
+                  <a:srgbClr val="0070C0"/>
+                </a:solidFill>
+              </a:rPr>
+              <a:t>Loop 3</a:t>
+            </a:r>
+          </a:p>
+          <a:p>
+            <a:r>
               <a:rPr lang="en-US" dirty="0"/>
-              <a:t>	check – our immediate</a:t>
-            </a:r>
-          </a:p>
-          <a:p>
-            <a:endParaRPr lang="en-US" dirty="0"/>
-          </a:p>
-          <a:p>
-            <a:r>
-              <a:rPr lang="en-US" dirty="0">
-                <a:solidFill>
-                  <a:srgbClr val="0070C0"/>
-                </a:solidFill>
-              </a:rPr>
-              <a:t>Loop 3</a:t>
-            </a:r>
-          </a:p>
-          <a:p>
-            <a:r>
-              <a:rPr lang="en-US" dirty="0"/>
-              <a:t>	timers – our timeout</a:t>
+              <a:t>	timers – </a:t>
+            </a:r>
+            <a:r>
+              <a:rPr lang="en-US" dirty="0">
+                <a:solidFill>
+                  <a:srgbClr val="FF0000"/>
+                </a:solidFill>
+              </a:rPr>
+              <a:t>our timeout</a:t>
             </a:r>
           </a:p>
           <a:p>
@@ -4184,7 +4209,7 @@
               <a:rPr lang="en-US" dirty="0">
                 <a:latin typeface="Courier" pitchFamily="2" charset="0"/>
               </a:rPr>
-              <a:t>Good for returning errors quickly but </a:t>
+              <a:t>Good for returning quickly but </a:t>
             </a:r>
             <a:r>
               <a:rPr lang="en-US" dirty="0" err="1">
@@ -4192,12 +4217,9 @@
               </a:rPr>
               <a:t>async</a:t>
             </a:r>
-            <a:r>
-              <a:rPr lang="en-US" dirty="0">
-                <a:latin typeface="Courier" pitchFamily="2" charset="0"/>
-              </a:rPr>
-              <a:t>, for example</a:t>
-            </a:r>
+            <a:endParaRPr lang="en-US" dirty="0">
+              <a:latin typeface="Courier" pitchFamily="2" charset="0"/>
+            </a:endParaRPr>
           </a:p>
           <a:p>
             <a:endParaRPr lang="en-US" dirty="0">
@@ -4250,7 +4272,7 @@
           <p:cNvPr id="2" name="Title 1">
             <a:extLst>
               <a:ext uri="{FF2B5EF4-FFF2-40B4-BE49-F238E27FC236}">
-                <a16:creationId xmlns:a16="http://schemas.microsoft.com/office/drawing/2014/main" id="{59BFF874-1742-4945-A92E-F238CA0271BB}"/>
+                <a16:creationId xmlns:a16="http://schemas.microsoft.com/office/drawing/2014/main" id="{7EC41842-6FD6-CE46-97AE-1054B03ECF12}"/>
               </a:ext>
             </a:extLst>
           </p:cNvPr>
@@ -4267,18 +4289,8 @@
           <a:lstStyle/>
           <a:p>
             <a:r>
-              <a:rPr lang="en-US" dirty="0" err="1">
-                <a:latin typeface="Fira Code" panose="020B0509050000020004" pitchFamily="49" charset="0"/>
-                <a:ea typeface="Fira Code" panose="020B0509050000020004" pitchFamily="49" charset="0"/>
-              </a:rPr>
-              <a:t>Promise.resolve</a:t>
-            </a:r>
-            <a:r>
-              <a:rPr lang="en-US" dirty="0">
-                <a:latin typeface="Fira Code" panose="020B0509050000020004" pitchFamily="49" charset="0"/>
-                <a:ea typeface="Fira Code" panose="020B0509050000020004" pitchFamily="49" charset="0"/>
-              </a:rPr>
-              <a:t>().then()</a:t>
+              <a:rPr lang="en-US" dirty="0"/>
+              <a:t>What about Promises?</a:t>
             </a:r>
           </a:p>
         </p:txBody>
@@ -4288,7 +4300,7 @@
           <p:cNvPr id="3" name="Content Placeholder 2">
             <a:extLst>
               <a:ext uri="{FF2B5EF4-FFF2-40B4-BE49-F238E27FC236}">
-                <a16:creationId xmlns:a16="http://schemas.microsoft.com/office/drawing/2014/main" id="{9FE67CAD-F613-194B-B350-B996744A1256}"/>
+                <a16:creationId xmlns:a16="http://schemas.microsoft.com/office/drawing/2014/main" id="{CEDBDB6E-9DAD-284A-927A-7C4F48C5A03C}"/>
               </a:ext>
             </a:extLst>
           </p:cNvPr>
@@ -4304,84 +4316,14 @@
           <a:bodyPr/>
           <a:lstStyle/>
           <a:p>
-            <a:r>
-              <a:rPr lang="en-US" dirty="0">
-                <a:latin typeface="Courier" pitchFamily="2" charset="0"/>
-              </a:rPr>
-              <a:t>Native Node.js implementation</a:t>
-            </a:r>
-          </a:p>
-          <a:p>
-            <a:r>
-              <a:rPr lang="en-US" dirty="0">
-                <a:latin typeface="Courier" pitchFamily="2" charset="0"/>
-              </a:rPr>
-              <a:t>Runs in the ‘microtask’ queue</a:t>
-            </a:r>
-          </a:p>
-          <a:p>
-            <a:r>
-              <a:rPr lang="en-US" dirty="0">
-                <a:latin typeface="Courier" pitchFamily="2" charset="0"/>
-              </a:rPr>
-              <a:t>Runs after </a:t>
-            </a:r>
-            <a:r>
-              <a:rPr lang="en-US" dirty="0" err="1">
-                <a:latin typeface="Courier" pitchFamily="2" charset="0"/>
-              </a:rPr>
-              <a:t>process.nextTick</a:t>
-            </a:r>
-            <a:endParaRPr lang="en-US" dirty="0">
-              <a:latin typeface="Courier" pitchFamily="2" charset="0"/>
-            </a:endParaRPr>
-          </a:p>
-          <a:p>
-            <a:r>
-              <a:rPr lang="en-US" dirty="0">
-                <a:latin typeface="Courier" pitchFamily="2" charset="0"/>
-              </a:rPr>
-              <a:t>Not really a part of the event loop</a:t>
-            </a:r>
-          </a:p>
-          <a:p>
-            <a:r>
-              <a:rPr lang="en-US" b="1" dirty="0">
-                <a:latin typeface="Courier" pitchFamily="2" charset="0"/>
-              </a:rPr>
-              <a:t>‘.then()’ code runs </a:t>
-            </a:r>
-            <a:r>
-              <a:rPr lang="en-US" b="1" dirty="0" err="1">
-                <a:latin typeface="Courier" pitchFamily="2" charset="0"/>
-              </a:rPr>
-              <a:t>async</a:t>
-            </a:r>
-            <a:endParaRPr lang="en-US" b="1" dirty="0">
-              <a:latin typeface="Courier" pitchFamily="2" charset="0"/>
-            </a:endParaRPr>
-          </a:p>
-          <a:p>
-            <a:r>
-              <a:rPr lang="en-US" dirty="0">
-                <a:latin typeface="Courier" pitchFamily="2" charset="0"/>
-              </a:rPr>
-              <a:t>same for .catch()/.finally()</a:t>
-            </a:r>
-            <a:endParaRPr lang="en-US" dirty="0"/>
-          </a:p>
-          <a:p>
-            <a:pPr marL="0" indent="0">
-              <a:buNone/>
-            </a:pPr>
-            <a:endParaRPr lang="en-US" dirty="0"/>
+            <a:endParaRPr lang="en-US"/>
           </a:p>
         </p:txBody>
       </p:sp>
     </p:spTree>
     <p:extLst>
       <p:ext uri="{BB962C8B-B14F-4D97-AF65-F5344CB8AC3E}">
-        <p14:creationId xmlns:p14="http://schemas.microsoft.com/office/powerpoint/2010/main" val="4237405598"/>
+        <p14:creationId xmlns:p14="http://schemas.microsoft.com/office/powerpoint/2010/main" val="1638373166"/>
       </p:ext>
     </p:extLst>
   </p:cSld>
@@ -4410,967 +4352,141 @@
       </p:grpSpPr>
       <p:sp>
         <p:nvSpPr>
-          <p:cNvPr id="4" name="Rectangle 3">
+          <p:cNvPr id="2" name="Title 1">
             <a:extLst>
               <a:ext uri="{FF2B5EF4-FFF2-40B4-BE49-F238E27FC236}">
-                <a16:creationId xmlns:a16="http://schemas.microsoft.com/office/drawing/2014/main" id="{194359BD-EED4-314D-809B-E8A662E9EAEF}"/>
+                <a16:creationId xmlns:a16="http://schemas.microsoft.com/office/drawing/2014/main" id="{59BFF874-1742-4945-A92E-F238CA0271BB}"/>
               </a:ext>
             </a:extLst>
           </p:cNvPr>
-          <p:cNvSpPr/>
-          <p:nvPr/>
-        </p:nvSpPr>
-        <p:spPr>
-          <a:xfrm>
-            <a:off x="2089532" y="441294"/>
-            <a:ext cx="9103605" cy="646331"/>
-          </a:xfrm>
-          <a:prstGeom prst="rect">
-            <a:avLst/>
-          </a:prstGeom>
-        </p:spPr>
-        <p:txBody>
-          <a:bodyPr wrap="square">
-            <a:spAutoFit/>
-          </a:bodyPr>
+          <p:cNvSpPr>
+            <a:spLocks noGrp="1"/>
+          </p:cNvSpPr>
+          <p:nvPr>
+            <p:ph type="title"/>
+          </p:nvPr>
+        </p:nvSpPr>
+        <p:spPr/>
+        <p:txBody>
+          <a:bodyPr/>
           <a:lstStyle/>
           <a:p>
-            <a:br>
-              <a:rPr lang="en-US" dirty="0"/>
-            </a:br>
-            <a:endParaRPr lang="en-US" dirty="0"/>
-          </a:p>
-        </p:txBody>
-      </p:sp>
-      <p:sp>
-        <p:nvSpPr>
-          <p:cNvPr id="7" name="Rectangle 6">
+            <a:r>
+              <a:rPr lang="en-US" dirty="0" err="1">
+                <a:latin typeface="Fira Code" panose="020B0509050000020004" pitchFamily="49" charset="0"/>
+                <a:ea typeface="Fira Code" panose="020B0509050000020004" pitchFamily="49" charset="0"/>
+              </a:rPr>
+              <a:t>Promise.resolve</a:t>
+            </a:r>
+            <a:r>
+              <a:rPr lang="en-US" dirty="0">
+                <a:latin typeface="Fira Code" panose="020B0509050000020004" pitchFamily="49" charset="0"/>
+                <a:ea typeface="Fira Code" panose="020B0509050000020004" pitchFamily="49" charset="0"/>
+              </a:rPr>
+              <a:t>().then()</a:t>
+            </a:r>
+          </a:p>
+        </p:txBody>
+      </p:sp>
+      <p:sp>
+        <p:nvSpPr>
+          <p:cNvPr id="3" name="Content Placeholder 2">
             <a:extLst>
               <a:ext uri="{FF2B5EF4-FFF2-40B4-BE49-F238E27FC236}">
-                <a16:creationId xmlns:a16="http://schemas.microsoft.com/office/drawing/2014/main" id="{004E8543-5F0F-4C46-9D7B-60E4ACC568B6}"/>
+                <a16:creationId xmlns:a16="http://schemas.microsoft.com/office/drawing/2014/main" id="{9FE67CAD-F613-194B-B350-B996744A1256}"/>
               </a:ext>
             </a:extLst>
           </p:cNvPr>
-          <p:cNvSpPr/>
-          <p:nvPr/>
-        </p:nvSpPr>
-        <p:spPr>
-          <a:xfrm>
-            <a:off x="3048000" y="474345"/>
-            <a:ext cx="6096000" cy="646331"/>
-          </a:xfrm>
-          <a:prstGeom prst="rect">
-            <a:avLst/>
-          </a:prstGeom>
-        </p:spPr>
-        <p:txBody>
-          <a:bodyPr>
-            <a:spAutoFit/>
-          </a:bodyPr>
+          <p:cNvSpPr>
+            <a:spLocks noGrp="1"/>
+          </p:cNvSpPr>
+          <p:nvPr>
+            <p:ph idx="1"/>
+          </p:nvPr>
+        </p:nvSpPr>
+        <p:spPr/>
+        <p:txBody>
+          <a:bodyPr/>
           <a:lstStyle/>
           <a:p>
-            <a:br>
-              <a:rPr lang="en-US" dirty="0"/>
-            </a:br>
-            <a:endParaRPr lang="en-US" dirty="0"/>
-          </a:p>
-        </p:txBody>
-      </p:sp>
-      <p:sp>
-        <p:nvSpPr>
-          <p:cNvPr id="8" name="Rectangle 7">
-            <a:extLst>
-              <a:ext uri="{FF2B5EF4-FFF2-40B4-BE49-F238E27FC236}">
-                <a16:creationId xmlns:a16="http://schemas.microsoft.com/office/drawing/2014/main" id="{19E6C532-6164-E144-8648-15881FAE93E2}"/>
-              </a:ext>
-            </a:extLst>
-          </p:cNvPr>
-          <p:cNvSpPr/>
-          <p:nvPr/>
-        </p:nvSpPr>
-        <p:spPr>
-          <a:xfrm>
-            <a:off x="2074843" y="474345"/>
-            <a:ext cx="7913783" cy="646331"/>
-          </a:xfrm>
-          <a:prstGeom prst="rect">
-            <a:avLst/>
-          </a:prstGeom>
-        </p:spPr>
-        <p:txBody>
-          <a:bodyPr wrap="square">
-            <a:spAutoFit/>
-          </a:bodyPr>
-          <a:lstStyle/>
-          <a:p>
-            <a:br>
-              <a:rPr lang="en-US" dirty="0"/>
-            </a:br>
-            <a:endParaRPr lang="en-US" dirty="0"/>
-          </a:p>
-        </p:txBody>
-      </p:sp>
-      <p:sp>
-        <p:nvSpPr>
-          <p:cNvPr id="6" name="Rectangle 5">
-            <a:extLst>
-              <a:ext uri="{FF2B5EF4-FFF2-40B4-BE49-F238E27FC236}">
-                <a16:creationId xmlns:a16="http://schemas.microsoft.com/office/drawing/2014/main" id="{67E8D6B2-5EEF-7643-BD6E-8E3128DD989A}"/>
-              </a:ext>
-            </a:extLst>
-          </p:cNvPr>
-          <p:cNvSpPr/>
-          <p:nvPr/>
-        </p:nvSpPr>
-        <p:spPr>
-          <a:xfrm>
-            <a:off x="1114097" y="289385"/>
-            <a:ext cx="10657489" cy="6001643"/>
-          </a:xfrm>
-          <a:prstGeom prst="rect">
-            <a:avLst/>
-          </a:prstGeom>
-        </p:spPr>
-        <p:txBody>
-          <a:bodyPr wrap="square">
-            <a:spAutoFit/>
-          </a:bodyPr>
-          <a:lstStyle/>
-          <a:p>
-            <a:r>
-              <a:rPr lang="en-US" sz="1600" b="1" dirty="0" err="1">
-                <a:solidFill>
-                  <a:srgbClr val="006699"/>
-                </a:solidFill>
-                <a:latin typeface="Courier" pitchFamily="2" charset="0"/>
-              </a:rPr>
-              <a:t>const</a:t>
-            </a:r>
-            <a:r>
-              <a:rPr lang="en-US" sz="1600" dirty="0">
-                <a:latin typeface="Courier" pitchFamily="2" charset="0"/>
-              </a:rPr>
-              <a:t> fs </a:t>
-            </a:r>
-            <a:r>
-              <a:rPr lang="en-US" sz="1600" dirty="0">
-                <a:solidFill>
-                  <a:srgbClr val="555555"/>
-                </a:solidFill>
-                <a:latin typeface="Courier" pitchFamily="2" charset="0"/>
-              </a:rPr>
-              <a:t>=</a:t>
-            </a:r>
-            <a:r>
-              <a:rPr lang="en-US" sz="1600" dirty="0">
-                <a:latin typeface="Courier" pitchFamily="2" charset="0"/>
-              </a:rPr>
-              <a:t> require(</a:t>
-            </a:r>
-            <a:r>
-              <a:rPr lang="en-US" sz="1600" dirty="0">
-                <a:solidFill>
-                  <a:srgbClr val="CC3300"/>
-                </a:solidFill>
-                <a:latin typeface="Courier" pitchFamily="2" charset="0"/>
-              </a:rPr>
-              <a:t>"fs"</a:t>
-            </a:r>
-            <a:r>
-              <a:rPr lang="en-US" sz="1600" dirty="0">
-                <a:latin typeface="Courier" pitchFamily="2" charset="0"/>
-              </a:rPr>
-              <a:t>);</a:t>
-            </a:r>
-          </a:p>
-          <a:p>
-            <a:br>
-              <a:rPr lang="en-US" sz="1600" dirty="0">
-                <a:latin typeface="Courier" pitchFamily="2" charset="0"/>
-              </a:rPr>
-            </a:br>
-            <a:endParaRPr lang="en-US" sz="1600" dirty="0">
+            <a:r>
+              <a:rPr lang="en-US" dirty="0">
+                <a:latin typeface="Courier" pitchFamily="2" charset="0"/>
+              </a:rPr>
+              <a:t>Runs in the ‘microtask’ queue</a:t>
+            </a:r>
+          </a:p>
+          <a:p>
+            <a:r>
+              <a:rPr lang="en-US" dirty="0">
+                <a:latin typeface="Courier" pitchFamily="2" charset="0"/>
+              </a:rPr>
+              <a:t>Runs after </a:t>
+            </a:r>
+            <a:r>
+              <a:rPr lang="en-US" dirty="0" err="1">
+                <a:latin typeface="Courier" pitchFamily="2" charset="0"/>
+              </a:rPr>
+              <a:t>process.nextTick</a:t>
+            </a:r>
+            <a:endParaRPr lang="en-US" dirty="0">
               <a:latin typeface="Courier" pitchFamily="2" charset="0"/>
             </a:endParaRPr>
           </a:p>
           <a:p>
             <a:r>
-              <a:rPr lang="en-US" sz="1600" b="1" dirty="0">
-                <a:solidFill>
-                  <a:srgbClr val="006699"/>
-                </a:solidFill>
-                <a:latin typeface="Courier" pitchFamily="2" charset="0"/>
-              </a:rPr>
-              <a:t>let</a:t>
-            </a:r>
-            <a:r>
-              <a:rPr lang="en-US" sz="1600" dirty="0">
-                <a:latin typeface="Courier" pitchFamily="2" charset="0"/>
-              </a:rPr>
-              <a:t> </a:t>
-            </a:r>
-            <a:r>
-              <a:rPr lang="en-US" sz="1600" dirty="0" err="1">
-                <a:latin typeface="Courier" pitchFamily="2" charset="0"/>
-              </a:rPr>
-              <a:t>i</a:t>
-            </a:r>
-            <a:r>
-              <a:rPr lang="en-US" sz="1600" dirty="0">
-                <a:latin typeface="Courier" pitchFamily="2" charset="0"/>
-              </a:rPr>
-              <a:t> </a:t>
-            </a:r>
-            <a:r>
-              <a:rPr lang="en-US" sz="1600" dirty="0">
-                <a:solidFill>
-                  <a:srgbClr val="555555"/>
-                </a:solidFill>
-                <a:latin typeface="Courier" pitchFamily="2" charset="0"/>
-              </a:rPr>
-              <a:t>=</a:t>
-            </a:r>
-            <a:r>
-              <a:rPr lang="en-US" sz="1600" dirty="0">
-                <a:latin typeface="Courier" pitchFamily="2" charset="0"/>
-              </a:rPr>
-              <a:t> </a:t>
-            </a:r>
-            <a:r>
-              <a:rPr lang="en-US" sz="1600" dirty="0">
-                <a:solidFill>
-                  <a:srgbClr val="FF6600"/>
-                </a:solidFill>
-                <a:latin typeface="Courier" pitchFamily="2" charset="0"/>
-              </a:rPr>
-              <a:t>0</a:t>
-            </a:r>
-            <a:r>
-              <a:rPr lang="en-US" sz="1600" dirty="0">
-                <a:latin typeface="Courier" pitchFamily="2" charset="0"/>
-              </a:rPr>
-              <a:t>;</a:t>
-            </a:r>
-          </a:p>
-          <a:p>
-            <a:br>
-              <a:rPr lang="en-US" sz="1600" dirty="0">
-                <a:latin typeface="Courier" pitchFamily="2" charset="0"/>
-              </a:rPr>
-            </a:br>
-            <a:endParaRPr lang="en-US" sz="1600" dirty="0">
+              <a:rPr lang="en-US" dirty="0">
+                <a:latin typeface="Courier" pitchFamily="2" charset="0"/>
+              </a:rPr>
+              <a:t>Not really a part of the event loop</a:t>
+            </a:r>
+          </a:p>
+          <a:p>
+            <a:r>
+              <a:rPr lang="en-US" b="1" dirty="0">
+                <a:latin typeface="Courier" pitchFamily="2" charset="0"/>
+              </a:rPr>
+              <a:t>‘.then()’ code runs </a:t>
+            </a:r>
+            <a:r>
+              <a:rPr lang="en-US" b="1" dirty="0" err="1">
+                <a:latin typeface="Courier" pitchFamily="2" charset="0"/>
+              </a:rPr>
+              <a:t>async</a:t>
+            </a:r>
+            <a:endParaRPr lang="en-US" b="1" dirty="0">
               <a:latin typeface="Courier" pitchFamily="2" charset="0"/>
             </a:endParaRPr>
           </a:p>
           <a:p>
             <a:r>
-              <a:rPr lang="en-US" sz="1600" dirty="0" err="1">
-                <a:latin typeface="Courier" pitchFamily="2" charset="0"/>
-              </a:rPr>
-              <a:t>fs.readFile</a:t>
-            </a:r>
-            <a:r>
-              <a:rPr lang="en-US" sz="1600" dirty="0">
-                <a:latin typeface="Courier" pitchFamily="2" charset="0"/>
-              </a:rPr>
-              <a:t>(__filename, () =&gt; {</a:t>
-            </a:r>
-          </a:p>
-          <a:p>
-            <a:r>
-              <a:rPr lang="en-US" sz="1600" dirty="0">
-                <a:latin typeface="Courier" pitchFamily="2" charset="0"/>
-              </a:rPr>
-              <a:t>  </a:t>
-            </a:r>
-            <a:r>
-              <a:rPr lang="en-US" sz="1600" dirty="0" err="1">
-                <a:latin typeface="Courier" pitchFamily="2" charset="0"/>
-              </a:rPr>
-              <a:t>console.log</a:t>
-            </a:r>
-            <a:r>
-              <a:rPr lang="en-US" sz="1600" dirty="0">
-                <a:latin typeface="Courier" pitchFamily="2" charset="0"/>
-              </a:rPr>
-              <a:t>(</a:t>
-            </a:r>
-            <a:r>
-              <a:rPr lang="en-US" sz="1600" dirty="0">
-                <a:solidFill>
-                  <a:srgbClr val="CC3300"/>
-                </a:solidFill>
-                <a:latin typeface="Courier" pitchFamily="2" charset="0"/>
-              </a:rPr>
-              <a:t>`</a:t>
-            </a:r>
-            <a:r>
-              <a:rPr lang="en-US" sz="1600" dirty="0">
-                <a:solidFill>
-                  <a:srgbClr val="AA0000"/>
-                </a:solidFill>
-                <a:latin typeface="Courier" pitchFamily="2" charset="0"/>
-              </a:rPr>
-              <a:t>${</a:t>
-            </a:r>
-            <a:r>
-              <a:rPr lang="en-US" sz="1600" dirty="0">
-                <a:solidFill>
-                  <a:srgbClr val="555555"/>
-                </a:solidFill>
-                <a:latin typeface="Courier" pitchFamily="2" charset="0"/>
-              </a:rPr>
-              <a:t>++</a:t>
-            </a:r>
-            <a:r>
-              <a:rPr lang="en-US" sz="1600" dirty="0" err="1">
-                <a:latin typeface="Courier" pitchFamily="2" charset="0"/>
-              </a:rPr>
-              <a:t>i</a:t>
-            </a:r>
-            <a:r>
-              <a:rPr lang="en-US" sz="1600" dirty="0">
-                <a:solidFill>
-                  <a:srgbClr val="AA0000"/>
-                </a:solidFill>
-                <a:latin typeface="Courier" pitchFamily="2" charset="0"/>
-              </a:rPr>
-              <a:t>}</a:t>
-            </a:r>
-            <a:r>
-              <a:rPr lang="en-US" sz="1600" dirty="0">
-                <a:solidFill>
-                  <a:srgbClr val="CC3300"/>
-                </a:solidFill>
-                <a:latin typeface="Courier" pitchFamily="2" charset="0"/>
-              </a:rPr>
-              <a:t>. I/O`</a:t>
-            </a:r>
-            <a:r>
-              <a:rPr lang="en-US" sz="1600" dirty="0">
-                <a:latin typeface="Courier" pitchFamily="2" charset="0"/>
-              </a:rPr>
-              <a:t>);</a:t>
-            </a:r>
-          </a:p>
-          <a:p>
-            <a:br>
-              <a:rPr lang="en-US" sz="1600" dirty="0">
-                <a:latin typeface="Courier" pitchFamily="2" charset="0"/>
-              </a:rPr>
-            </a:br>
-            <a:endParaRPr lang="en-US" sz="1600" dirty="0">
-              <a:latin typeface="Courier" pitchFamily="2" charset="0"/>
-            </a:endParaRPr>
-          </a:p>
-          <a:p>
-            <a:r>
-              <a:rPr lang="en-US" sz="1600" dirty="0">
-                <a:latin typeface="Courier" pitchFamily="2" charset="0"/>
-              </a:rPr>
-              <a:t>  </a:t>
-            </a:r>
-            <a:r>
-              <a:rPr lang="en-US" sz="1600" dirty="0" err="1">
-                <a:latin typeface="Courier" pitchFamily="2" charset="0"/>
-              </a:rPr>
-              <a:t>setTimeout</a:t>
-            </a:r>
-            <a:r>
-              <a:rPr lang="en-US" sz="1600" dirty="0">
-                <a:latin typeface="Courier" pitchFamily="2" charset="0"/>
-              </a:rPr>
-              <a:t>(() =&gt; </a:t>
-            </a:r>
-            <a:r>
-              <a:rPr lang="en-US" sz="1600" dirty="0" err="1">
-                <a:latin typeface="Courier" pitchFamily="2" charset="0"/>
-              </a:rPr>
-              <a:t>console.log</a:t>
-            </a:r>
-            <a:r>
-              <a:rPr lang="en-US" sz="1600" dirty="0">
-                <a:latin typeface="Courier" pitchFamily="2" charset="0"/>
-              </a:rPr>
-              <a:t>(</a:t>
-            </a:r>
-            <a:r>
-              <a:rPr lang="en-US" sz="1600" dirty="0">
-                <a:solidFill>
-                  <a:srgbClr val="CC3300"/>
-                </a:solidFill>
-                <a:latin typeface="Courier" pitchFamily="2" charset="0"/>
-              </a:rPr>
-              <a:t>`</a:t>
-            </a:r>
-            <a:r>
-              <a:rPr lang="en-US" sz="1600" dirty="0">
-                <a:solidFill>
-                  <a:srgbClr val="AA0000"/>
-                </a:solidFill>
-                <a:latin typeface="Courier" pitchFamily="2" charset="0"/>
-              </a:rPr>
-              <a:t>${</a:t>
-            </a:r>
-            <a:r>
-              <a:rPr lang="en-US" sz="1600" dirty="0">
-                <a:solidFill>
-                  <a:srgbClr val="555555"/>
-                </a:solidFill>
-                <a:latin typeface="Courier" pitchFamily="2" charset="0"/>
-              </a:rPr>
-              <a:t>++</a:t>
-            </a:r>
-            <a:r>
-              <a:rPr lang="en-US" sz="1600" dirty="0" err="1">
-                <a:latin typeface="Courier" pitchFamily="2" charset="0"/>
-              </a:rPr>
-              <a:t>i</a:t>
-            </a:r>
-            <a:r>
-              <a:rPr lang="en-US" sz="1600" dirty="0">
-                <a:solidFill>
-                  <a:srgbClr val="AA0000"/>
-                </a:solidFill>
-                <a:latin typeface="Courier" pitchFamily="2" charset="0"/>
-              </a:rPr>
-              <a:t>}</a:t>
-            </a:r>
-            <a:r>
-              <a:rPr lang="en-US" sz="1600" dirty="0">
-                <a:solidFill>
-                  <a:srgbClr val="CC3300"/>
-                </a:solidFill>
-                <a:latin typeface="Courier" pitchFamily="2" charset="0"/>
-              </a:rPr>
-              <a:t>. in I/O - timeout`</a:t>
-            </a:r>
-            <a:r>
-              <a:rPr lang="en-US" sz="1600" dirty="0">
-                <a:latin typeface="Courier" pitchFamily="2" charset="0"/>
-              </a:rPr>
-              <a:t>), </a:t>
-            </a:r>
-            <a:r>
-              <a:rPr lang="en-US" sz="1600" dirty="0">
-                <a:solidFill>
-                  <a:srgbClr val="FF6600"/>
-                </a:solidFill>
-                <a:latin typeface="Courier" pitchFamily="2" charset="0"/>
-              </a:rPr>
-              <a:t>0</a:t>
-            </a:r>
-            <a:r>
-              <a:rPr lang="en-US" sz="1600" dirty="0">
-                <a:latin typeface="Courier" pitchFamily="2" charset="0"/>
-              </a:rPr>
-              <a:t>);</a:t>
-            </a:r>
-          </a:p>
-          <a:p>
-            <a:br>
-              <a:rPr lang="en-US" sz="1600" dirty="0">
-                <a:latin typeface="Courier" pitchFamily="2" charset="0"/>
-              </a:rPr>
-            </a:br>
-            <a:endParaRPr lang="en-US" sz="1600" dirty="0">
-              <a:latin typeface="Courier" pitchFamily="2" charset="0"/>
-            </a:endParaRPr>
-          </a:p>
-          <a:p>
-            <a:r>
-              <a:rPr lang="en-US" sz="1600" dirty="0">
-                <a:latin typeface="Courier" pitchFamily="2" charset="0"/>
-              </a:rPr>
-              <a:t>  </a:t>
-            </a:r>
-            <a:r>
-              <a:rPr lang="en-US" sz="1600" dirty="0" err="1">
-                <a:latin typeface="Courier" pitchFamily="2" charset="0"/>
-              </a:rPr>
-              <a:t>setImmediate</a:t>
-            </a:r>
-            <a:r>
-              <a:rPr lang="en-US" sz="1600" dirty="0">
-                <a:latin typeface="Courier" pitchFamily="2" charset="0"/>
-              </a:rPr>
-              <a:t>(() =&gt; </a:t>
-            </a:r>
-            <a:r>
-              <a:rPr lang="en-US" sz="1600" dirty="0" err="1">
-                <a:latin typeface="Courier" pitchFamily="2" charset="0"/>
-              </a:rPr>
-              <a:t>console.log</a:t>
-            </a:r>
-            <a:r>
-              <a:rPr lang="en-US" sz="1600" dirty="0">
-                <a:latin typeface="Courier" pitchFamily="2" charset="0"/>
-              </a:rPr>
-              <a:t>(</a:t>
-            </a:r>
-            <a:r>
-              <a:rPr lang="en-US" sz="1600" dirty="0">
-                <a:solidFill>
-                  <a:srgbClr val="CC3300"/>
-                </a:solidFill>
-                <a:latin typeface="Courier" pitchFamily="2" charset="0"/>
-              </a:rPr>
-              <a:t>`</a:t>
-            </a:r>
-            <a:r>
-              <a:rPr lang="en-US" sz="1600" dirty="0">
-                <a:solidFill>
-                  <a:srgbClr val="AA0000"/>
-                </a:solidFill>
-                <a:latin typeface="Courier" pitchFamily="2" charset="0"/>
-              </a:rPr>
-              <a:t>${</a:t>
-            </a:r>
-            <a:r>
-              <a:rPr lang="en-US" sz="1600" dirty="0">
-                <a:solidFill>
-                  <a:srgbClr val="555555"/>
-                </a:solidFill>
-                <a:latin typeface="Courier" pitchFamily="2" charset="0"/>
-              </a:rPr>
-              <a:t>++</a:t>
-            </a:r>
-            <a:r>
-              <a:rPr lang="en-US" sz="1600" dirty="0" err="1">
-                <a:latin typeface="Courier" pitchFamily="2" charset="0"/>
-              </a:rPr>
-              <a:t>i</a:t>
-            </a:r>
-            <a:r>
-              <a:rPr lang="en-US" sz="1600" dirty="0">
-                <a:solidFill>
-                  <a:srgbClr val="AA0000"/>
-                </a:solidFill>
-                <a:latin typeface="Courier" pitchFamily="2" charset="0"/>
-              </a:rPr>
-              <a:t>}</a:t>
-            </a:r>
-            <a:r>
-              <a:rPr lang="en-US" sz="1600" dirty="0">
-                <a:solidFill>
-                  <a:srgbClr val="CC3300"/>
-                </a:solidFill>
-                <a:latin typeface="Courier" pitchFamily="2" charset="0"/>
-              </a:rPr>
-              <a:t>. in I/O - immediate`</a:t>
-            </a:r>
-            <a:r>
-              <a:rPr lang="en-US" sz="1600" dirty="0">
-                <a:latin typeface="Courier" pitchFamily="2" charset="0"/>
-              </a:rPr>
-              <a:t>));</a:t>
-            </a:r>
-          </a:p>
-          <a:p>
-            <a:br>
-              <a:rPr lang="en-US" sz="1600" dirty="0">
-                <a:latin typeface="Courier" pitchFamily="2" charset="0"/>
-              </a:rPr>
-            </a:br>
-            <a:endParaRPr lang="en-US" sz="1600" dirty="0">
-              <a:latin typeface="Courier" pitchFamily="2" charset="0"/>
-            </a:endParaRPr>
-          </a:p>
-          <a:p>
-            <a:r>
-              <a:rPr lang="en-US" sz="1600" dirty="0">
-                <a:latin typeface="Courier" pitchFamily="2" charset="0"/>
-              </a:rPr>
-              <a:t>  </a:t>
-            </a:r>
-            <a:r>
-              <a:rPr lang="en-US" sz="1600" dirty="0" err="1">
-                <a:latin typeface="Courier" pitchFamily="2" charset="0"/>
-              </a:rPr>
-              <a:t>process.nextTick</a:t>
-            </a:r>
-            <a:r>
-              <a:rPr lang="en-US" sz="1600" dirty="0">
-                <a:latin typeface="Courier" pitchFamily="2" charset="0"/>
-              </a:rPr>
-              <a:t>(() =&gt; </a:t>
-            </a:r>
-            <a:r>
-              <a:rPr lang="en-US" sz="1600" dirty="0" err="1">
-                <a:latin typeface="Courier" pitchFamily="2" charset="0"/>
-              </a:rPr>
-              <a:t>console.log</a:t>
-            </a:r>
-            <a:r>
-              <a:rPr lang="en-US" sz="1600" dirty="0">
-                <a:latin typeface="Courier" pitchFamily="2" charset="0"/>
-              </a:rPr>
-              <a:t>(</a:t>
-            </a:r>
-            <a:r>
-              <a:rPr lang="en-US" sz="1600" dirty="0">
-                <a:solidFill>
-                  <a:srgbClr val="CC3300"/>
-                </a:solidFill>
-                <a:latin typeface="Courier" pitchFamily="2" charset="0"/>
-              </a:rPr>
-              <a:t>`</a:t>
-            </a:r>
-            <a:r>
-              <a:rPr lang="en-US" sz="1600" dirty="0">
-                <a:solidFill>
-                  <a:srgbClr val="AA0000"/>
-                </a:solidFill>
-                <a:latin typeface="Courier" pitchFamily="2" charset="0"/>
-              </a:rPr>
-              <a:t>${</a:t>
-            </a:r>
-            <a:r>
-              <a:rPr lang="en-US" sz="1600" dirty="0">
-                <a:solidFill>
-                  <a:srgbClr val="555555"/>
-                </a:solidFill>
-                <a:latin typeface="Courier" pitchFamily="2" charset="0"/>
-              </a:rPr>
-              <a:t>++</a:t>
-            </a:r>
-            <a:r>
-              <a:rPr lang="en-US" sz="1600" dirty="0" err="1">
-                <a:latin typeface="Courier" pitchFamily="2" charset="0"/>
-              </a:rPr>
-              <a:t>i</a:t>
-            </a:r>
-            <a:r>
-              <a:rPr lang="en-US" sz="1600" dirty="0">
-                <a:solidFill>
-                  <a:srgbClr val="AA0000"/>
-                </a:solidFill>
-                <a:latin typeface="Courier" pitchFamily="2" charset="0"/>
-              </a:rPr>
-              <a:t>}</a:t>
-            </a:r>
-            <a:r>
-              <a:rPr lang="en-US" sz="1600" dirty="0">
-                <a:solidFill>
-                  <a:srgbClr val="CC3300"/>
-                </a:solidFill>
-                <a:latin typeface="Courier" pitchFamily="2" charset="0"/>
-              </a:rPr>
-              <a:t>. in I/O - </a:t>
-            </a:r>
-            <a:r>
-              <a:rPr lang="en-US" sz="1600" dirty="0" err="1">
-                <a:solidFill>
-                  <a:srgbClr val="CC3300"/>
-                </a:solidFill>
-                <a:latin typeface="Courier" pitchFamily="2" charset="0"/>
-              </a:rPr>
-              <a:t>nextTick</a:t>
-            </a:r>
-            <a:r>
-              <a:rPr lang="en-US" sz="1600" dirty="0">
-                <a:solidFill>
-                  <a:srgbClr val="CC3300"/>
-                </a:solidFill>
-                <a:latin typeface="Courier" pitchFamily="2" charset="0"/>
-              </a:rPr>
-              <a:t>`</a:t>
-            </a:r>
-            <a:r>
-              <a:rPr lang="en-US" sz="1600" dirty="0">
-                <a:latin typeface="Courier" pitchFamily="2" charset="0"/>
-              </a:rPr>
-              <a:t>));</a:t>
-            </a:r>
-          </a:p>
-          <a:p>
-            <a:br>
-              <a:rPr lang="en-US" sz="1600" dirty="0">
-                <a:latin typeface="Courier" pitchFamily="2" charset="0"/>
-              </a:rPr>
-            </a:br>
-            <a:endParaRPr lang="en-US" sz="1600" dirty="0">
-              <a:latin typeface="Courier" pitchFamily="2" charset="0"/>
-            </a:endParaRPr>
-          </a:p>
-          <a:p>
-            <a:r>
-              <a:rPr lang="en-US" sz="1600" dirty="0">
-                <a:latin typeface="Courier" pitchFamily="2" charset="0"/>
-              </a:rPr>
-              <a:t>  </a:t>
-            </a:r>
-            <a:r>
-              <a:rPr lang="en-US" sz="1600" dirty="0" err="1">
-                <a:solidFill>
-                  <a:srgbClr val="336666"/>
-                </a:solidFill>
-                <a:latin typeface="Courier" pitchFamily="2" charset="0"/>
-              </a:rPr>
-              <a:t>Promise</a:t>
-            </a:r>
-            <a:r>
-              <a:rPr lang="en-US" sz="1600" dirty="0" err="1">
-                <a:latin typeface="Courier" pitchFamily="2" charset="0"/>
-              </a:rPr>
-              <a:t>.resolve</a:t>
-            </a:r>
-            <a:r>
-              <a:rPr lang="en-US" sz="1600" dirty="0">
-                <a:latin typeface="Courier" pitchFamily="2" charset="0"/>
-              </a:rPr>
-              <a:t>()</a:t>
-            </a:r>
-          </a:p>
-          <a:p>
-            <a:r>
-              <a:rPr lang="en-US" sz="1600" dirty="0">
-                <a:latin typeface="Courier" pitchFamily="2" charset="0"/>
-              </a:rPr>
-              <a:t>    .then(() =&gt; </a:t>
-            </a:r>
-            <a:r>
-              <a:rPr lang="en-US" sz="1600" dirty="0" err="1">
-                <a:latin typeface="Courier" pitchFamily="2" charset="0"/>
-              </a:rPr>
-              <a:t>console.log</a:t>
-            </a:r>
-            <a:r>
-              <a:rPr lang="en-US" sz="1600" dirty="0">
-                <a:latin typeface="Courier" pitchFamily="2" charset="0"/>
-              </a:rPr>
-              <a:t>(</a:t>
-            </a:r>
-            <a:r>
-              <a:rPr lang="en-US" sz="1600" dirty="0">
-                <a:solidFill>
-                  <a:srgbClr val="CC3300"/>
-                </a:solidFill>
-                <a:latin typeface="Courier" pitchFamily="2" charset="0"/>
-              </a:rPr>
-              <a:t>`</a:t>
-            </a:r>
-            <a:r>
-              <a:rPr lang="en-US" sz="1600" dirty="0">
-                <a:solidFill>
-                  <a:srgbClr val="AA0000"/>
-                </a:solidFill>
-                <a:latin typeface="Courier" pitchFamily="2" charset="0"/>
-              </a:rPr>
-              <a:t>${</a:t>
-            </a:r>
-            <a:r>
-              <a:rPr lang="en-US" sz="1600" dirty="0">
-                <a:solidFill>
-                  <a:srgbClr val="555555"/>
-                </a:solidFill>
-                <a:latin typeface="Courier" pitchFamily="2" charset="0"/>
-              </a:rPr>
-              <a:t>++</a:t>
-            </a:r>
-            <a:r>
-              <a:rPr lang="en-US" sz="1600" dirty="0" err="1">
-                <a:latin typeface="Courier" pitchFamily="2" charset="0"/>
-              </a:rPr>
-              <a:t>i</a:t>
-            </a:r>
-            <a:r>
-              <a:rPr lang="en-US" sz="1600" dirty="0">
-                <a:solidFill>
-                  <a:srgbClr val="AA0000"/>
-                </a:solidFill>
-                <a:latin typeface="Courier" pitchFamily="2" charset="0"/>
-              </a:rPr>
-              <a:t>}</a:t>
-            </a:r>
-            <a:r>
-              <a:rPr lang="en-US" sz="1600" dirty="0">
-                <a:solidFill>
-                  <a:srgbClr val="CC3300"/>
-                </a:solidFill>
-                <a:latin typeface="Courier" pitchFamily="2" charset="0"/>
-              </a:rPr>
-              <a:t>. in I/O - promise`</a:t>
-            </a:r>
-            <a:r>
-              <a:rPr lang="en-US" sz="1600" dirty="0">
-                <a:latin typeface="Courier" pitchFamily="2" charset="0"/>
-              </a:rPr>
-              <a:t>))</a:t>
-            </a:r>
-          </a:p>
-          <a:p>
-            <a:r>
-              <a:rPr lang="en-US" sz="1600" dirty="0">
-                <a:latin typeface="Courier" pitchFamily="2" charset="0"/>
-              </a:rPr>
-              <a:t>    .then(() =&gt; </a:t>
-            </a:r>
-            <a:r>
-              <a:rPr lang="en-US" sz="1600" dirty="0" err="1">
-                <a:latin typeface="Courier" pitchFamily="2" charset="0"/>
-              </a:rPr>
-              <a:t>console.log</a:t>
-            </a:r>
-            <a:r>
-              <a:rPr lang="en-US" sz="1600" dirty="0">
-                <a:latin typeface="Courier" pitchFamily="2" charset="0"/>
-              </a:rPr>
-              <a:t>(</a:t>
-            </a:r>
-            <a:r>
-              <a:rPr lang="en-US" sz="1600" dirty="0">
-                <a:solidFill>
-                  <a:srgbClr val="CC3300"/>
-                </a:solidFill>
-                <a:latin typeface="Courier" pitchFamily="2" charset="0"/>
-              </a:rPr>
-              <a:t>`</a:t>
-            </a:r>
-            <a:r>
-              <a:rPr lang="en-US" sz="1600" dirty="0">
-                <a:solidFill>
-                  <a:srgbClr val="AA0000"/>
-                </a:solidFill>
-                <a:latin typeface="Courier" pitchFamily="2" charset="0"/>
-              </a:rPr>
-              <a:t>${</a:t>
-            </a:r>
-            <a:r>
-              <a:rPr lang="en-US" sz="1600" dirty="0">
-                <a:solidFill>
-                  <a:srgbClr val="555555"/>
-                </a:solidFill>
-                <a:latin typeface="Courier" pitchFamily="2" charset="0"/>
-              </a:rPr>
-              <a:t>++</a:t>
-            </a:r>
-            <a:r>
-              <a:rPr lang="en-US" sz="1600" dirty="0" err="1">
-                <a:latin typeface="Courier" pitchFamily="2" charset="0"/>
-              </a:rPr>
-              <a:t>i</a:t>
-            </a:r>
-            <a:r>
-              <a:rPr lang="en-US" sz="1600" dirty="0">
-                <a:solidFill>
-                  <a:srgbClr val="AA0000"/>
-                </a:solidFill>
-                <a:latin typeface="Courier" pitchFamily="2" charset="0"/>
-              </a:rPr>
-              <a:t>}</a:t>
-            </a:r>
-            <a:r>
-              <a:rPr lang="en-US" sz="1600" dirty="0">
-                <a:solidFill>
-                  <a:srgbClr val="CC3300"/>
-                </a:solidFill>
-                <a:latin typeface="Courier" pitchFamily="2" charset="0"/>
-              </a:rPr>
-              <a:t>. in I/O - promise`</a:t>
-            </a:r>
-            <a:r>
-              <a:rPr lang="en-US" sz="1600" dirty="0">
-                <a:latin typeface="Courier" pitchFamily="2" charset="0"/>
-              </a:rPr>
-              <a:t>))</a:t>
-            </a:r>
-          </a:p>
-          <a:p>
-            <a:r>
-              <a:rPr lang="en-US" sz="1600" dirty="0">
-                <a:latin typeface="Courier" pitchFamily="2" charset="0"/>
-              </a:rPr>
-              <a:t>    .then(() =&gt; </a:t>
-            </a:r>
-            <a:r>
-              <a:rPr lang="en-US" sz="1600" dirty="0" err="1">
-                <a:latin typeface="Courier" pitchFamily="2" charset="0"/>
-              </a:rPr>
-              <a:t>console.log</a:t>
-            </a:r>
-            <a:r>
-              <a:rPr lang="en-US" sz="1600" dirty="0">
-                <a:latin typeface="Courier" pitchFamily="2" charset="0"/>
-              </a:rPr>
-              <a:t>(</a:t>
-            </a:r>
-            <a:r>
-              <a:rPr lang="en-US" sz="1600" dirty="0">
-                <a:solidFill>
-                  <a:srgbClr val="CC3300"/>
-                </a:solidFill>
-                <a:latin typeface="Courier" pitchFamily="2" charset="0"/>
-              </a:rPr>
-              <a:t>`</a:t>
-            </a:r>
-            <a:r>
-              <a:rPr lang="en-US" sz="1600" dirty="0">
-                <a:solidFill>
-                  <a:srgbClr val="AA0000"/>
-                </a:solidFill>
-                <a:latin typeface="Courier" pitchFamily="2" charset="0"/>
-              </a:rPr>
-              <a:t>${</a:t>
-            </a:r>
-            <a:r>
-              <a:rPr lang="en-US" sz="1600" dirty="0">
-                <a:solidFill>
-                  <a:srgbClr val="555555"/>
-                </a:solidFill>
-                <a:latin typeface="Courier" pitchFamily="2" charset="0"/>
-              </a:rPr>
-              <a:t>++</a:t>
-            </a:r>
-            <a:r>
-              <a:rPr lang="en-US" sz="1600" dirty="0" err="1">
-                <a:latin typeface="Courier" pitchFamily="2" charset="0"/>
-              </a:rPr>
-              <a:t>i</a:t>
-            </a:r>
-            <a:r>
-              <a:rPr lang="en-US" sz="1600" dirty="0">
-                <a:solidFill>
-                  <a:srgbClr val="AA0000"/>
-                </a:solidFill>
-                <a:latin typeface="Courier" pitchFamily="2" charset="0"/>
-              </a:rPr>
-              <a:t>}</a:t>
-            </a:r>
-            <a:r>
-              <a:rPr lang="en-US" sz="1600" dirty="0">
-                <a:solidFill>
-                  <a:srgbClr val="CC3300"/>
-                </a:solidFill>
-                <a:latin typeface="Courier" pitchFamily="2" charset="0"/>
-              </a:rPr>
-              <a:t>. in I/O - promise`</a:t>
-            </a:r>
-            <a:r>
-              <a:rPr lang="en-US" sz="1600" dirty="0">
-                <a:latin typeface="Courier" pitchFamily="2" charset="0"/>
-              </a:rPr>
-              <a:t>));</a:t>
-            </a:r>
-          </a:p>
-          <a:p>
-            <a:r>
-              <a:rPr lang="en-US" sz="1600" dirty="0">
-                <a:latin typeface="Courier" pitchFamily="2" charset="0"/>
-              </a:rPr>
-              <a:t>});</a:t>
-            </a:r>
-            <a:endParaRPr lang="en-US" sz="1600" dirty="0">
-              <a:effectLst/>
-              <a:latin typeface="Courier" pitchFamily="2" charset="0"/>
-            </a:endParaRPr>
+              <a:rPr lang="en-US" dirty="0">
+                <a:latin typeface="Courier" pitchFamily="2" charset="0"/>
+              </a:rPr>
+              <a:t>same for .catch()/.finally()</a:t>
+            </a:r>
+          </a:p>
+          <a:p>
+            <a:r>
+              <a:rPr lang="en-US" dirty="0">
+                <a:latin typeface="Courier" pitchFamily="2" charset="0"/>
+              </a:rPr>
+              <a:t>Unhandled exceptions reported at end of queue</a:t>
+            </a:r>
+            <a:endParaRPr lang="en-US" dirty="0"/>
+          </a:p>
+          <a:p>
+            <a:pPr marL="0" indent="0">
+              <a:buNone/>
+            </a:pPr>
+            <a:endParaRPr lang="en-US" dirty="0"/>
           </a:p>
         </p:txBody>
       </p:sp>
     </p:spTree>
     <p:extLst>
       <p:ext uri="{BB962C8B-B14F-4D97-AF65-F5344CB8AC3E}">
-        <p14:creationId xmlns:p14="http://schemas.microsoft.com/office/powerpoint/2010/main" val="3319906999"/>
+        <p14:creationId xmlns:p14="http://schemas.microsoft.com/office/powerpoint/2010/main" val="4237405598"/>
       </p:ext>
     </p:extLst>
   </p:cSld>
@@ -5399,180 +4515,967 @@
       </p:grpSpPr>
       <p:sp>
         <p:nvSpPr>
-          <p:cNvPr id="4" name="TextBox 3">
+          <p:cNvPr id="4" name="Rectangle 3">
             <a:extLst>
               <a:ext uri="{FF2B5EF4-FFF2-40B4-BE49-F238E27FC236}">
-                <a16:creationId xmlns:a16="http://schemas.microsoft.com/office/drawing/2014/main" id="{4481B8D7-60EA-C540-82E5-252FE3C62AFB}"/>
+                <a16:creationId xmlns:a16="http://schemas.microsoft.com/office/drawing/2014/main" id="{194359BD-EED4-314D-809B-E8A662E9EAEF}"/>
               </a:ext>
             </a:extLst>
           </p:cNvPr>
-          <p:cNvSpPr txBox="1"/>
+          <p:cNvSpPr/>
           <p:nvPr/>
         </p:nvSpPr>
         <p:spPr>
           <a:xfrm>
-            <a:off x="1429407" y="693683"/>
-            <a:ext cx="3037490" cy="4801314"/>
+            <a:off x="2089532" y="441294"/>
+            <a:ext cx="9103605" cy="646331"/>
           </a:xfrm>
           <a:prstGeom prst="rect">
             <a:avLst/>
           </a:prstGeom>
-          <a:noFill/>
-          <a:ln>
-            <a:noFill/>
-          </a:ln>
         </p:spPr>
         <p:txBody>
-          <a:bodyPr wrap="square" rtlCol="0">
+          <a:bodyPr wrap="square">
             <a:spAutoFit/>
           </a:bodyPr>
           <a:lstStyle/>
           <a:p>
-            <a:r>
-              <a:rPr lang="en-US" dirty="0">
-                <a:solidFill>
-                  <a:srgbClr val="0070C0"/>
-                </a:solidFill>
-              </a:rPr>
-              <a:t>Loop 1</a:t>
-            </a:r>
-          </a:p>
-          <a:p>
-            <a:r>
+            <a:br>
               <a:rPr lang="en-US" dirty="0"/>
-              <a:t>	timers -</a:t>
-            </a:r>
-            <a:endParaRPr lang="en-US" b="1" dirty="0"/>
-          </a:p>
-          <a:p>
-            <a:r>
+            </a:br>
+            <a:endParaRPr lang="en-US" dirty="0"/>
+          </a:p>
+        </p:txBody>
+      </p:sp>
+      <p:sp>
+        <p:nvSpPr>
+          <p:cNvPr id="7" name="Rectangle 6">
+            <a:extLst>
+              <a:ext uri="{FF2B5EF4-FFF2-40B4-BE49-F238E27FC236}">
+                <a16:creationId xmlns:a16="http://schemas.microsoft.com/office/drawing/2014/main" id="{004E8543-5F0F-4C46-9D7B-60E4ACC568B6}"/>
+              </a:ext>
+            </a:extLst>
+          </p:cNvPr>
+          <p:cNvSpPr/>
+          <p:nvPr/>
+        </p:nvSpPr>
+        <p:spPr>
+          <a:xfrm>
+            <a:off x="3048000" y="474345"/>
+            <a:ext cx="6096000" cy="646331"/>
+          </a:xfrm>
+          <a:prstGeom prst="rect">
+            <a:avLst/>
+          </a:prstGeom>
+        </p:spPr>
+        <p:txBody>
+          <a:bodyPr>
+            <a:spAutoFit/>
+          </a:bodyPr>
+          <a:lstStyle/>
+          <a:p>
+            <a:br>
               <a:rPr lang="en-US" dirty="0"/>
-              <a:t>	poll -</a:t>
-            </a:r>
-          </a:p>
-          <a:p>
-            <a:r>
+            </a:br>
+            <a:endParaRPr lang="en-US" dirty="0"/>
+          </a:p>
+        </p:txBody>
+      </p:sp>
+      <p:sp>
+        <p:nvSpPr>
+          <p:cNvPr id="8" name="Rectangle 7">
+            <a:extLst>
+              <a:ext uri="{FF2B5EF4-FFF2-40B4-BE49-F238E27FC236}">
+                <a16:creationId xmlns:a16="http://schemas.microsoft.com/office/drawing/2014/main" id="{19E6C532-6164-E144-8648-15881FAE93E2}"/>
+              </a:ext>
+            </a:extLst>
+          </p:cNvPr>
+          <p:cNvSpPr/>
+          <p:nvPr/>
+        </p:nvSpPr>
+        <p:spPr>
+          <a:xfrm>
+            <a:off x="2074843" y="474345"/>
+            <a:ext cx="7913783" cy="646331"/>
+          </a:xfrm>
+          <a:prstGeom prst="rect">
+            <a:avLst/>
+          </a:prstGeom>
+        </p:spPr>
+        <p:txBody>
+          <a:bodyPr wrap="square">
+            <a:spAutoFit/>
+          </a:bodyPr>
+          <a:lstStyle/>
+          <a:p>
+            <a:br>
               <a:rPr lang="en-US" dirty="0"/>
-              <a:t>	check – </a:t>
-            </a:r>
-          </a:p>
-          <a:p>
-            <a:endParaRPr lang="en-US" dirty="0">
-              <a:solidFill>
-                <a:srgbClr val="0070C0"/>
-              </a:solidFill>
+            </a:br>
+            <a:endParaRPr lang="en-US" dirty="0"/>
+          </a:p>
+        </p:txBody>
+      </p:sp>
+      <p:sp>
+        <p:nvSpPr>
+          <p:cNvPr id="6" name="Rectangle 5">
+            <a:extLst>
+              <a:ext uri="{FF2B5EF4-FFF2-40B4-BE49-F238E27FC236}">
+                <a16:creationId xmlns:a16="http://schemas.microsoft.com/office/drawing/2014/main" id="{67E8D6B2-5EEF-7643-BD6E-8E3128DD989A}"/>
+              </a:ext>
+            </a:extLst>
+          </p:cNvPr>
+          <p:cNvSpPr/>
+          <p:nvPr/>
+        </p:nvSpPr>
+        <p:spPr>
+          <a:xfrm>
+            <a:off x="1114097" y="289385"/>
+            <a:ext cx="10657489" cy="6001643"/>
+          </a:xfrm>
+          <a:prstGeom prst="rect">
+            <a:avLst/>
+          </a:prstGeom>
+        </p:spPr>
+        <p:txBody>
+          <a:bodyPr wrap="square">
+            <a:spAutoFit/>
+          </a:bodyPr>
+          <a:lstStyle/>
+          <a:p>
+            <a:r>
+              <a:rPr lang="en-US" sz="1600" b="1" dirty="0" err="1">
+                <a:solidFill>
+                  <a:srgbClr val="006699"/>
+                </a:solidFill>
+                <a:latin typeface="Courier" pitchFamily="2" charset="0"/>
+              </a:rPr>
+              <a:t>const</a:t>
+            </a:r>
+            <a:r>
+              <a:rPr lang="en-US" sz="1600" dirty="0">
+                <a:latin typeface="Courier" pitchFamily="2" charset="0"/>
+              </a:rPr>
+              <a:t> fs </a:t>
+            </a:r>
+            <a:r>
+              <a:rPr lang="en-US" sz="1600" dirty="0">
+                <a:solidFill>
+                  <a:srgbClr val="555555"/>
+                </a:solidFill>
+                <a:latin typeface="Courier" pitchFamily="2" charset="0"/>
+              </a:rPr>
+              <a:t>=</a:t>
+            </a:r>
+            <a:r>
+              <a:rPr lang="en-US" sz="1600" dirty="0">
+                <a:latin typeface="Courier" pitchFamily="2" charset="0"/>
+              </a:rPr>
+              <a:t> require(</a:t>
+            </a:r>
+            <a:r>
+              <a:rPr lang="en-US" sz="1600" dirty="0">
+                <a:solidFill>
+                  <a:srgbClr val="CC3300"/>
+                </a:solidFill>
+                <a:latin typeface="Courier" pitchFamily="2" charset="0"/>
+              </a:rPr>
+              <a:t>"fs"</a:t>
+            </a:r>
+            <a:r>
+              <a:rPr lang="en-US" sz="1600" dirty="0">
+                <a:latin typeface="Courier" pitchFamily="2" charset="0"/>
+              </a:rPr>
+              <a:t>);</a:t>
+            </a:r>
+          </a:p>
+          <a:p>
+            <a:br>
+              <a:rPr lang="en-US" sz="1600" dirty="0">
+                <a:latin typeface="Courier" pitchFamily="2" charset="0"/>
+              </a:rPr>
+            </a:br>
+            <a:endParaRPr lang="en-US" sz="1600" dirty="0">
+              <a:latin typeface="Courier" pitchFamily="2" charset="0"/>
             </a:endParaRPr>
           </a:p>
           <a:p>
             <a:r>
-              <a:rPr lang="en-US" dirty="0">
-                <a:solidFill>
-                  <a:srgbClr val="0070C0"/>
-                </a:solidFill>
-              </a:rPr>
-              <a:t>Loop 2</a:t>
-            </a:r>
-          </a:p>
-          <a:p>
-            <a:r>
-              <a:rPr lang="en-US" dirty="0"/>
-              <a:t>	timers – </a:t>
-            </a:r>
-          </a:p>
-          <a:p>
-            <a:r>
-              <a:rPr lang="en-US" dirty="0"/>
-              <a:t>	poll – </a:t>
-            </a:r>
-            <a:r>
-              <a:rPr lang="en-US" dirty="0" err="1"/>
-              <a:t>readFile</a:t>
-            </a:r>
-            <a:endParaRPr lang="en-US" dirty="0"/>
-          </a:p>
-          <a:p>
-            <a:r>
-              <a:rPr lang="en-US" dirty="0"/>
-              <a:t>		</a:t>
-            </a:r>
-            <a:r>
-              <a:rPr lang="en-US" dirty="0">
-                <a:sym typeface="Wingdings" pitchFamily="2" charset="2"/>
-              </a:rPr>
-              <a:t> </a:t>
-            </a:r>
-            <a:r>
-              <a:rPr lang="en-US" dirty="0" err="1"/>
+              <a:rPr lang="en-US" sz="1600" b="1" dirty="0">
+                <a:solidFill>
+                  <a:srgbClr val="006699"/>
+                </a:solidFill>
+                <a:latin typeface="Courier" pitchFamily="2" charset="0"/>
+              </a:rPr>
+              <a:t>let</a:t>
+            </a:r>
+            <a:r>
+              <a:rPr lang="en-US" sz="1600" dirty="0">
+                <a:latin typeface="Courier" pitchFamily="2" charset="0"/>
+              </a:rPr>
+              <a:t> </a:t>
+            </a:r>
+            <a:r>
+              <a:rPr lang="en-US" sz="1600" dirty="0" err="1">
+                <a:latin typeface="Courier" pitchFamily="2" charset="0"/>
+              </a:rPr>
+              <a:t>i</a:t>
+            </a:r>
+            <a:r>
+              <a:rPr lang="en-US" sz="1600" dirty="0">
+                <a:latin typeface="Courier" pitchFamily="2" charset="0"/>
+              </a:rPr>
+              <a:t> </a:t>
+            </a:r>
+            <a:r>
+              <a:rPr lang="en-US" sz="1600" dirty="0">
+                <a:solidFill>
+                  <a:srgbClr val="555555"/>
+                </a:solidFill>
+                <a:latin typeface="Courier" pitchFamily="2" charset="0"/>
+              </a:rPr>
+              <a:t>=</a:t>
+            </a:r>
+            <a:r>
+              <a:rPr lang="en-US" sz="1600" dirty="0">
+                <a:latin typeface="Courier" pitchFamily="2" charset="0"/>
+              </a:rPr>
+              <a:t> </a:t>
+            </a:r>
+            <a:r>
+              <a:rPr lang="en-US" sz="1600" dirty="0">
+                <a:solidFill>
+                  <a:srgbClr val="FF6600"/>
+                </a:solidFill>
+                <a:latin typeface="Courier" pitchFamily="2" charset="0"/>
+              </a:rPr>
+              <a:t>0</a:t>
+            </a:r>
+            <a:r>
+              <a:rPr lang="en-US" sz="1600" dirty="0">
+                <a:latin typeface="Courier" pitchFamily="2" charset="0"/>
+              </a:rPr>
+              <a:t>;</a:t>
+            </a:r>
+          </a:p>
+          <a:p>
+            <a:br>
+              <a:rPr lang="en-US" sz="1600" dirty="0">
+                <a:latin typeface="Courier" pitchFamily="2" charset="0"/>
+              </a:rPr>
+            </a:br>
+            <a:endParaRPr lang="en-US" sz="1600" dirty="0">
+              <a:latin typeface="Courier" pitchFamily="2" charset="0"/>
+            </a:endParaRPr>
+          </a:p>
+          <a:p>
+            <a:r>
+              <a:rPr lang="en-US" sz="1600" dirty="0" err="1">
+                <a:latin typeface="Courier" pitchFamily="2" charset="0"/>
+              </a:rPr>
+              <a:t>fs.readFile</a:t>
+            </a:r>
+            <a:r>
+              <a:rPr lang="en-US" sz="1600" dirty="0">
+                <a:latin typeface="Courier" pitchFamily="2" charset="0"/>
+              </a:rPr>
+              <a:t>(__filename, () =&gt; {</a:t>
+            </a:r>
+          </a:p>
+          <a:p>
+            <a:r>
+              <a:rPr lang="en-US" sz="1600" dirty="0">
+                <a:latin typeface="Courier" pitchFamily="2" charset="0"/>
+              </a:rPr>
+              <a:t>  </a:t>
+            </a:r>
+            <a:r>
+              <a:rPr lang="en-US" sz="1600" dirty="0" err="1">
+                <a:latin typeface="Courier" pitchFamily="2" charset="0"/>
+              </a:rPr>
+              <a:t>console.log</a:t>
+            </a:r>
+            <a:r>
+              <a:rPr lang="en-US" sz="1600" dirty="0">
+                <a:latin typeface="Courier" pitchFamily="2" charset="0"/>
+              </a:rPr>
+              <a:t>(</a:t>
+            </a:r>
+            <a:r>
+              <a:rPr lang="en-US" sz="1600" dirty="0">
+                <a:solidFill>
+                  <a:srgbClr val="CC3300"/>
+                </a:solidFill>
+                <a:latin typeface="Courier" pitchFamily="2" charset="0"/>
+              </a:rPr>
+              <a:t>`</a:t>
+            </a:r>
+            <a:r>
+              <a:rPr lang="en-US" sz="1600" dirty="0">
+                <a:solidFill>
+                  <a:srgbClr val="AA0000"/>
+                </a:solidFill>
+                <a:latin typeface="Courier" pitchFamily="2" charset="0"/>
+              </a:rPr>
+              <a:t>${</a:t>
+            </a:r>
+            <a:r>
+              <a:rPr lang="en-US" sz="1600" dirty="0">
+                <a:solidFill>
+                  <a:srgbClr val="555555"/>
+                </a:solidFill>
+                <a:latin typeface="Courier" pitchFamily="2" charset="0"/>
+              </a:rPr>
+              <a:t>++</a:t>
+            </a:r>
+            <a:r>
+              <a:rPr lang="en-US" sz="1600" dirty="0" err="1">
+                <a:latin typeface="Courier" pitchFamily="2" charset="0"/>
+              </a:rPr>
+              <a:t>i</a:t>
+            </a:r>
+            <a:r>
+              <a:rPr lang="en-US" sz="1600" dirty="0">
+                <a:solidFill>
+                  <a:srgbClr val="AA0000"/>
+                </a:solidFill>
+                <a:latin typeface="Courier" pitchFamily="2" charset="0"/>
+              </a:rPr>
+              <a:t>}</a:t>
+            </a:r>
+            <a:r>
+              <a:rPr lang="en-US" sz="1600" dirty="0">
+                <a:solidFill>
+                  <a:srgbClr val="CC3300"/>
+                </a:solidFill>
+                <a:latin typeface="Courier" pitchFamily="2" charset="0"/>
+              </a:rPr>
+              <a:t>. I/O`</a:t>
+            </a:r>
+            <a:r>
+              <a:rPr lang="en-US" sz="1600" dirty="0">
+                <a:latin typeface="Courier" pitchFamily="2" charset="0"/>
+              </a:rPr>
+              <a:t>);</a:t>
+            </a:r>
+          </a:p>
+          <a:p>
+            <a:br>
+              <a:rPr lang="en-US" sz="1600" dirty="0">
+                <a:latin typeface="Courier" pitchFamily="2" charset="0"/>
+              </a:rPr>
+            </a:br>
+            <a:endParaRPr lang="en-US" sz="1600" dirty="0">
+              <a:latin typeface="Courier" pitchFamily="2" charset="0"/>
+            </a:endParaRPr>
+          </a:p>
+          <a:p>
+            <a:r>
+              <a:rPr lang="en-US" sz="1600" dirty="0">
+                <a:latin typeface="Courier" pitchFamily="2" charset="0"/>
+              </a:rPr>
+              <a:t>  </a:t>
+            </a:r>
+            <a:r>
+              <a:rPr lang="en-US" sz="1600" dirty="0" err="1">
+                <a:latin typeface="Courier" pitchFamily="2" charset="0"/>
+              </a:rPr>
+              <a:t>setTimeout</a:t>
+            </a:r>
+            <a:r>
+              <a:rPr lang="en-US" sz="1600" dirty="0">
+                <a:latin typeface="Courier" pitchFamily="2" charset="0"/>
+              </a:rPr>
+              <a:t>(() =&gt; </a:t>
+            </a:r>
+            <a:r>
+              <a:rPr lang="en-US" sz="1600" dirty="0" err="1">
+                <a:latin typeface="Courier" pitchFamily="2" charset="0"/>
+              </a:rPr>
+              <a:t>console.log</a:t>
+            </a:r>
+            <a:r>
+              <a:rPr lang="en-US" sz="1600" dirty="0">
+                <a:latin typeface="Courier" pitchFamily="2" charset="0"/>
+              </a:rPr>
+              <a:t>(</a:t>
+            </a:r>
+            <a:r>
+              <a:rPr lang="en-US" sz="1600" dirty="0">
+                <a:solidFill>
+                  <a:srgbClr val="CC3300"/>
+                </a:solidFill>
+                <a:latin typeface="Courier" pitchFamily="2" charset="0"/>
+              </a:rPr>
+              <a:t>`</a:t>
+            </a:r>
+            <a:r>
+              <a:rPr lang="en-US" sz="1600" dirty="0">
+                <a:solidFill>
+                  <a:srgbClr val="AA0000"/>
+                </a:solidFill>
+                <a:latin typeface="Courier" pitchFamily="2" charset="0"/>
+              </a:rPr>
+              <a:t>${</a:t>
+            </a:r>
+            <a:r>
+              <a:rPr lang="en-US" sz="1600" dirty="0">
+                <a:solidFill>
+                  <a:srgbClr val="555555"/>
+                </a:solidFill>
+                <a:latin typeface="Courier" pitchFamily="2" charset="0"/>
+              </a:rPr>
+              <a:t>++</a:t>
+            </a:r>
+            <a:r>
+              <a:rPr lang="en-US" sz="1600" dirty="0" err="1">
+                <a:latin typeface="Courier" pitchFamily="2" charset="0"/>
+              </a:rPr>
+              <a:t>i</a:t>
+            </a:r>
+            <a:r>
+              <a:rPr lang="en-US" sz="1600" dirty="0">
+                <a:solidFill>
+                  <a:srgbClr val="AA0000"/>
+                </a:solidFill>
+                <a:latin typeface="Courier" pitchFamily="2" charset="0"/>
+              </a:rPr>
+              <a:t>}</a:t>
+            </a:r>
+            <a:r>
+              <a:rPr lang="en-US" sz="1600" dirty="0">
+                <a:solidFill>
+                  <a:srgbClr val="CC3300"/>
+                </a:solidFill>
+                <a:latin typeface="Courier" pitchFamily="2" charset="0"/>
+              </a:rPr>
+              <a:t>. in I/O - timeout`</a:t>
+            </a:r>
+            <a:r>
+              <a:rPr lang="en-US" sz="1600" dirty="0">
+                <a:latin typeface="Courier" pitchFamily="2" charset="0"/>
+              </a:rPr>
+              <a:t>), </a:t>
+            </a:r>
+            <a:r>
+              <a:rPr lang="en-US" sz="1600" dirty="0">
+                <a:solidFill>
+                  <a:srgbClr val="FF6600"/>
+                </a:solidFill>
+                <a:latin typeface="Courier" pitchFamily="2" charset="0"/>
+              </a:rPr>
+              <a:t>0</a:t>
+            </a:r>
+            <a:r>
+              <a:rPr lang="en-US" sz="1600" dirty="0">
+                <a:latin typeface="Courier" pitchFamily="2" charset="0"/>
+              </a:rPr>
+              <a:t>);</a:t>
+            </a:r>
+          </a:p>
+          <a:p>
+            <a:br>
+              <a:rPr lang="en-US" sz="1600" dirty="0">
+                <a:latin typeface="Courier" pitchFamily="2" charset="0"/>
+              </a:rPr>
+            </a:br>
+            <a:endParaRPr lang="en-US" sz="1600" dirty="0">
+              <a:latin typeface="Courier" pitchFamily="2" charset="0"/>
+            </a:endParaRPr>
+          </a:p>
+          <a:p>
+            <a:r>
+              <a:rPr lang="en-US" sz="1600" dirty="0">
+                <a:latin typeface="Courier" pitchFamily="2" charset="0"/>
+              </a:rPr>
+              <a:t>  </a:t>
+            </a:r>
+            <a:r>
+              <a:rPr lang="en-US" sz="1600" dirty="0" err="1">
+                <a:latin typeface="Courier" pitchFamily="2" charset="0"/>
+              </a:rPr>
+              <a:t>setImmediate</a:t>
+            </a:r>
+            <a:r>
+              <a:rPr lang="en-US" sz="1600" dirty="0">
+                <a:latin typeface="Courier" pitchFamily="2" charset="0"/>
+              </a:rPr>
+              <a:t>(() =&gt; </a:t>
+            </a:r>
+            <a:r>
+              <a:rPr lang="en-US" sz="1600" dirty="0" err="1">
+                <a:latin typeface="Courier" pitchFamily="2" charset="0"/>
+              </a:rPr>
+              <a:t>console.log</a:t>
+            </a:r>
+            <a:r>
+              <a:rPr lang="en-US" sz="1600" dirty="0">
+                <a:latin typeface="Courier" pitchFamily="2" charset="0"/>
+              </a:rPr>
+              <a:t>(</a:t>
+            </a:r>
+            <a:r>
+              <a:rPr lang="en-US" sz="1600" dirty="0">
+                <a:solidFill>
+                  <a:srgbClr val="CC3300"/>
+                </a:solidFill>
+                <a:latin typeface="Courier" pitchFamily="2" charset="0"/>
+              </a:rPr>
+              <a:t>`</a:t>
+            </a:r>
+            <a:r>
+              <a:rPr lang="en-US" sz="1600" dirty="0">
+                <a:solidFill>
+                  <a:srgbClr val="AA0000"/>
+                </a:solidFill>
+                <a:latin typeface="Courier" pitchFamily="2" charset="0"/>
+              </a:rPr>
+              <a:t>${</a:t>
+            </a:r>
+            <a:r>
+              <a:rPr lang="en-US" sz="1600" dirty="0">
+                <a:solidFill>
+                  <a:srgbClr val="555555"/>
+                </a:solidFill>
+                <a:latin typeface="Courier" pitchFamily="2" charset="0"/>
+              </a:rPr>
+              <a:t>++</a:t>
+            </a:r>
+            <a:r>
+              <a:rPr lang="en-US" sz="1600" dirty="0" err="1">
+                <a:latin typeface="Courier" pitchFamily="2" charset="0"/>
+              </a:rPr>
+              <a:t>i</a:t>
+            </a:r>
+            <a:r>
+              <a:rPr lang="en-US" sz="1600" dirty="0">
+                <a:solidFill>
+                  <a:srgbClr val="AA0000"/>
+                </a:solidFill>
+                <a:latin typeface="Courier" pitchFamily="2" charset="0"/>
+              </a:rPr>
+              <a:t>}</a:t>
+            </a:r>
+            <a:r>
+              <a:rPr lang="en-US" sz="1600" dirty="0">
+                <a:solidFill>
+                  <a:srgbClr val="CC3300"/>
+                </a:solidFill>
+                <a:latin typeface="Courier" pitchFamily="2" charset="0"/>
+              </a:rPr>
+              <a:t>. in I/O - immediate`</a:t>
+            </a:r>
+            <a:r>
+              <a:rPr lang="en-US" sz="1600" dirty="0">
+                <a:latin typeface="Courier" pitchFamily="2" charset="0"/>
+              </a:rPr>
+              <a:t>));</a:t>
+            </a:r>
+          </a:p>
+          <a:p>
+            <a:br>
+              <a:rPr lang="en-US" sz="1600" dirty="0">
+                <a:latin typeface="Courier" pitchFamily="2" charset="0"/>
+              </a:rPr>
+            </a:br>
+            <a:endParaRPr lang="en-US" sz="1600" dirty="0">
+              <a:latin typeface="Courier" pitchFamily="2" charset="0"/>
+            </a:endParaRPr>
+          </a:p>
+          <a:p>
+            <a:r>
+              <a:rPr lang="en-US" sz="1600" dirty="0">
+                <a:latin typeface="Courier" pitchFamily="2" charset="0"/>
+              </a:rPr>
+              <a:t>  </a:t>
+            </a:r>
+            <a:r>
+              <a:rPr lang="en-US" sz="1600" dirty="0" err="1">
+                <a:latin typeface="Courier" pitchFamily="2" charset="0"/>
+              </a:rPr>
+              <a:t>process.nextTick</a:t>
+            </a:r>
+            <a:r>
+              <a:rPr lang="en-US" sz="1600" dirty="0">
+                <a:latin typeface="Courier" pitchFamily="2" charset="0"/>
+              </a:rPr>
+              <a:t>(() =&gt; </a:t>
+            </a:r>
+            <a:r>
+              <a:rPr lang="en-US" sz="1600" dirty="0" err="1">
+                <a:latin typeface="Courier" pitchFamily="2" charset="0"/>
+              </a:rPr>
+              <a:t>console.log</a:t>
+            </a:r>
+            <a:r>
+              <a:rPr lang="en-US" sz="1600" dirty="0">
+                <a:latin typeface="Courier" pitchFamily="2" charset="0"/>
+              </a:rPr>
+              <a:t>(</a:t>
+            </a:r>
+            <a:r>
+              <a:rPr lang="en-US" sz="1600" dirty="0">
+                <a:solidFill>
+                  <a:srgbClr val="CC3300"/>
+                </a:solidFill>
+                <a:latin typeface="Courier" pitchFamily="2" charset="0"/>
+              </a:rPr>
+              <a:t>`</a:t>
+            </a:r>
+            <a:r>
+              <a:rPr lang="en-US" sz="1600" dirty="0">
+                <a:solidFill>
+                  <a:srgbClr val="AA0000"/>
+                </a:solidFill>
+                <a:latin typeface="Courier" pitchFamily="2" charset="0"/>
+              </a:rPr>
+              <a:t>${</a:t>
+            </a:r>
+            <a:r>
+              <a:rPr lang="en-US" sz="1600" dirty="0">
+                <a:solidFill>
+                  <a:srgbClr val="555555"/>
+                </a:solidFill>
+                <a:latin typeface="Courier" pitchFamily="2" charset="0"/>
+              </a:rPr>
+              <a:t>++</a:t>
+            </a:r>
+            <a:r>
+              <a:rPr lang="en-US" sz="1600" dirty="0" err="1">
+                <a:latin typeface="Courier" pitchFamily="2" charset="0"/>
+              </a:rPr>
+              <a:t>i</a:t>
+            </a:r>
+            <a:r>
+              <a:rPr lang="en-US" sz="1600" dirty="0">
+                <a:solidFill>
+                  <a:srgbClr val="AA0000"/>
+                </a:solidFill>
+                <a:latin typeface="Courier" pitchFamily="2" charset="0"/>
+              </a:rPr>
+              <a:t>}</a:t>
+            </a:r>
+            <a:r>
+              <a:rPr lang="en-US" sz="1600" dirty="0">
+                <a:solidFill>
+                  <a:srgbClr val="CC3300"/>
+                </a:solidFill>
+                <a:latin typeface="Courier" pitchFamily="2" charset="0"/>
+              </a:rPr>
+              <a:t>. in I/O - </a:t>
+            </a:r>
+            <a:r>
+              <a:rPr lang="en-US" sz="1600" dirty="0" err="1">
+                <a:solidFill>
+                  <a:srgbClr val="CC3300"/>
+                </a:solidFill>
+                <a:latin typeface="Courier" pitchFamily="2" charset="0"/>
+              </a:rPr>
               <a:t>nextTick</a:t>
             </a:r>
-            <a:endParaRPr lang="en-US" dirty="0"/>
-          </a:p>
-          <a:p>
-            <a:r>
-              <a:rPr lang="en-US" dirty="0"/>
-              <a:t>	 	</a:t>
-            </a:r>
-            <a:r>
-              <a:rPr lang="en-US" dirty="0">
-                <a:sym typeface="Wingdings" pitchFamily="2" charset="2"/>
-              </a:rPr>
-              <a:t> </a:t>
-            </a:r>
-            <a:r>
-              <a:rPr lang="en-US" dirty="0"/>
-              <a:t>microtasks </a:t>
-            </a:r>
-          </a:p>
-          <a:p>
-            <a:r>
-              <a:rPr lang="en-US" dirty="0"/>
-              <a:t>	check – our immediate</a:t>
-            </a:r>
-          </a:p>
-          <a:p>
-            <a:endParaRPr lang="en-US" dirty="0">
-              <a:solidFill>
-                <a:srgbClr val="0070C0"/>
-              </a:solidFill>
+            <a:r>
+              <a:rPr lang="en-US" sz="1600" dirty="0">
+                <a:solidFill>
+                  <a:srgbClr val="CC3300"/>
+                </a:solidFill>
+                <a:latin typeface="Courier" pitchFamily="2" charset="0"/>
+              </a:rPr>
+              <a:t>`</a:t>
+            </a:r>
+            <a:r>
+              <a:rPr lang="en-US" sz="1600" dirty="0">
+                <a:latin typeface="Courier" pitchFamily="2" charset="0"/>
+              </a:rPr>
+              <a:t>));</a:t>
+            </a:r>
+          </a:p>
+          <a:p>
+            <a:br>
+              <a:rPr lang="en-US" sz="1600" dirty="0">
+                <a:latin typeface="Courier" pitchFamily="2" charset="0"/>
+              </a:rPr>
+            </a:br>
+            <a:endParaRPr lang="en-US" sz="1600" dirty="0">
+              <a:latin typeface="Courier" pitchFamily="2" charset="0"/>
             </a:endParaRPr>
           </a:p>
           <a:p>
             <a:r>
-              <a:rPr lang="en-US" dirty="0">
-                <a:solidFill>
-                  <a:srgbClr val="0070C0"/>
-                </a:solidFill>
-              </a:rPr>
-              <a:t>Loop 3 </a:t>
-            </a:r>
-          </a:p>
-          <a:p>
-            <a:r>
-              <a:rPr lang="en-US" dirty="0"/>
-              <a:t>	timers – our timeout</a:t>
-            </a:r>
-          </a:p>
-          <a:p>
-            <a:r>
-              <a:rPr lang="en-US" dirty="0"/>
-              <a:t>	poll – </a:t>
-            </a:r>
-          </a:p>
-          <a:p>
-            <a:r>
-              <a:rPr lang="en-US" dirty="0"/>
-              <a:t>	check - </a:t>
-            </a:r>
-          </a:p>
-          <a:p>
-            <a:endParaRPr lang="en-US" dirty="0"/>
+              <a:rPr lang="en-US" sz="1600" dirty="0">
+                <a:latin typeface="Courier" pitchFamily="2" charset="0"/>
+              </a:rPr>
+              <a:t>  </a:t>
+            </a:r>
+            <a:r>
+              <a:rPr lang="en-US" sz="1600" dirty="0" err="1">
+                <a:solidFill>
+                  <a:srgbClr val="336666"/>
+                </a:solidFill>
+                <a:latin typeface="Courier" pitchFamily="2" charset="0"/>
+              </a:rPr>
+              <a:t>Promise</a:t>
+            </a:r>
+            <a:r>
+              <a:rPr lang="en-US" sz="1600" dirty="0" err="1">
+                <a:latin typeface="Courier" pitchFamily="2" charset="0"/>
+              </a:rPr>
+              <a:t>.resolve</a:t>
+            </a:r>
+            <a:r>
+              <a:rPr lang="en-US" sz="1600" dirty="0">
+                <a:latin typeface="Courier" pitchFamily="2" charset="0"/>
+              </a:rPr>
+              <a:t>()</a:t>
+            </a:r>
+          </a:p>
+          <a:p>
+            <a:r>
+              <a:rPr lang="en-US" sz="1600" dirty="0">
+                <a:latin typeface="Courier" pitchFamily="2" charset="0"/>
+              </a:rPr>
+              <a:t>    .then(() =&gt; </a:t>
+            </a:r>
+            <a:r>
+              <a:rPr lang="en-US" sz="1600" dirty="0" err="1">
+                <a:latin typeface="Courier" pitchFamily="2" charset="0"/>
+              </a:rPr>
+              <a:t>console.log</a:t>
+            </a:r>
+            <a:r>
+              <a:rPr lang="en-US" sz="1600" dirty="0">
+                <a:latin typeface="Courier" pitchFamily="2" charset="0"/>
+              </a:rPr>
+              <a:t>(</a:t>
+            </a:r>
+            <a:r>
+              <a:rPr lang="en-US" sz="1600" dirty="0">
+                <a:solidFill>
+                  <a:srgbClr val="CC3300"/>
+                </a:solidFill>
+                <a:latin typeface="Courier" pitchFamily="2" charset="0"/>
+              </a:rPr>
+              <a:t>`</a:t>
+            </a:r>
+            <a:r>
+              <a:rPr lang="en-US" sz="1600" dirty="0">
+                <a:solidFill>
+                  <a:srgbClr val="AA0000"/>
+                </a:solidFill>
+                <a:latin typeface="Courier" pitchFamily="2" charset="0"/>
+              </a:rPr>
+              <a:t>${</a:t>
+            </a:r>
+            <a:r>
+              <a:rPr lang="en-US" sz="1600" dirty="0">
+                <a:solidFill>
+                  <a:srgbClr val="555555"/>
+                </a:solidFill>
+                <a:latin typeface="Courier" pitchFamily="2" charset="0"/>
+              </a:rPr>
+              <a:t>++</a:t>
+            </a:r>
+            <a:r>
+              <a:rPr lang="en-US" sz="1600" dirty="0" err="1">
+                <a:latin typeface="Courier" pitchFamily="2" charset="0"/>
+              </a:rPr>
+              <a:t>i</a:t>
+            </a:r>
+            <a:r>
+              <a:rPr lang="en-US" sz="1600" dirty="0">
+                <a:solidFill>
+                  <a:srgbClr val="AA0000"/>
+                </a:solidFill>
+                <a:latin typeface="Courier" pitchFamily="2" charset="0"/>
+              </a:rPr>
+              <a:t>}</a:t>
+            </a:r>
+            <a:r>
+              <a:rPr lang="en-US" sz="1600" dirty="0">
+                <a:solidFill>
+                  <a:srgbClr val="CC3300"/>
+                </a:solidFill>
+                <a:latin typeface="Courier" pitchFamily="2" charset="0"/>
+              </a:rPr>
+              <a:t>. in I/O - promise`</a:t>
+            </a:r>
+            <a:r>
+              <a:rPr lang="en-US" sz="1600" dirty="0">
+                <a:latin typeface="Courier" pitchFamily="2" charset="0"/>
+              </a:rPr>
+              <a:t>))</a:t>
+            </a:r>
+          </a:p>
+          <a:p>
+            <a:r>
+              <a:rPr lang="en-US" sz="1600" dirty="0">
+                <a:latin typeface="Courier" pitchFamily="2" charset="0"/>
+              </a:rPr>
+              <a:t>    .then(() =&gt; </a:t>
+            </a:r>
+            <a:r>
+              <a:rPr lang="en-US" sz="1600" dirty="0" err="1">
+                <a:latin typeface="Courier" pitchFamily="2" charset="0"/>
+              </a:rPr>
+              <a:t>console.log</a:t>
+            </a:r>
+            <a:r>
+              <a:rPr lang="en-US" sz="1600" dirty="0">
+                <a:latin typeface="Courier" pitchFamily="2" charset="0"/>
+              </a:rPr>
+              <a:t>(</a:t>
+            </a:r>
+            <a:r>
+              <a:rPr lang="en-US" sz="1600" dirty="0">
+                <a:solidFill>
+                  <a:srgbClr val="CC3300"/>
+                </a:solidFill>
+                <a:latin typeface="Courier" pitchFamily="2" charset="0"/>
+              </a:rPr>
+              <a:t>`</a:t>
+            </a:r>
+            <a:r>
+              <a:rPr lang="en-US" sz="1600" dirty="0">
+                <a:solidFill>
+                  <a:srgbClr val="AA0000"/>
+                </a:solidFill>
+                <a:latin typeface="Courier" pitchFamily="2" charset="0"/>
+              </a:rPr>
+              <a:t>${</a:t>
+            </a:r>
+            <a:r>
+              <a:rPr lang="en-US" sz="1600" dirty="0">
+                <a:solidFill>
+                  <a:srgbClr val="555555"/>
+                </a:solidFill>
+                <a:latin typeface="Courier" pitchFamily="2" charset="0"/>
+              </a:rPr>
+              <a:t>++</a:t>
+            </a:r>
+            <a:r>
+              <a:rPr lang="en-US" sz="1600" dirty="0" err="1">
+                <a:latin typeface="Courier" pitchFamily="2" charset="0"/>
+              </a:rPr>
+              <a:t>i</a:t>
+            </a:r>
+            <a:r>
+              <a:rPr lang="en-US" sz="1600" dirty="0">
+                <a:solidFill>
+                  <a:srgbClr val="AA0000"/>
+                </a:solidFill>
+                <a:latin typeface="Courier" pitchFamily="2" charset="0"/>
+              </a:rPr>
+              <a:t>}</a:t>
+            </a:r>
+            <a:r>
+              <a:rPr lang="en-US" sz="1600" dirty="0">
+                <a:solidFill>
+                  <a:srgbClr val="CC3300"/>
+                </a:solidFill>
+                <a:latin typeface="Courier" pitchFamily="2" charset="0"/>
+              </a:rPr>
+              <a:t>. in I/O - promise`</a:t>
+            </a:r>
+            <a:r>
+              <a:rPr lang="en-US" sz="1600" dirty="0">
+                <a:latin typeface="Courier" pitchFamily="2" charset="0"/>
+              </a:rPr>
+              <a:t>))</a:t>
+            </a:r>
+          </a:p>
+          <a:p>
+            <a:r>
+              <a:rPr lang="en-US" sz="1600" dirty="0">
+                <a:latin typeface="Courier" pitchFamily="2" charset="0"/>
+              </a:rPr>
+              <a:t>    .then(() =&gt; </a:t>
+            </a:r>
+            <a:r>
+              <a:rPr lang="en-US" sz="1600" dirty="0" err="1">
+                <a:latin typeface="Courier" pitchFamily="2" charset="0"/>
+              </a:rPr>
+              <a:t>console.log</a:t>
+            </a:r>
+            <a:r>
+              <a:rPr lang="en-US" sz="1600" dirty="0">
+                <a:latin typeface="Courier" pitchFamily="2" charset="0"/>
+              </a:rPr>
+              <a:t>(</a:t>
+            </a:r>
+            <a:r>
+              <a:rPr lang="en-US" sz="1600" dirty="0">
+                <a:solidFill>
+                  <a:srgbClr val="CC3300"/>
+                </a:solidFill>
+                <a:latin typeface="Courier" pitchFamily="2" charset="0"/>
+              </a:rPr>
+              <a:t>`</a:t>
+            </a:r>
+            <a:r>
+              <a:rPr lang="en-US" sz="1600" dirty="0">
+                <a:solidFill>
+                  <a:srgbClr val="AA0000"/>
+                </a:solidFill>
+                <a:latin typeface="Courier" pitchFamily="2" charset="0"/>
+              </a:rPr>
+              <a:t>${</a:t>
+            </a:r>
+            <a:r>
+              <a:rPr lang="en-US" sz="1600" dirty="0">
+                <a:solidFill>
+                  <a:srgbClr val="555555"/>
+                </a:solidFill>
+                <a:latin typeface="Courier" pitchFamily="2" charset="0"/>
+              </a:rPr>
+              <a:t>++</a:t>
+            </a:r>
+            <a:r>
+              <a:rPr lang="en-US" sz="1600" dirty="0" err="1">
+                <a:latin typeface="Courier" pitchFamily="2" charset="0"/>
+              </a:rPr>
+              <a:t>i</a:t>
+            </a:r>
+            <a:r>
+              <a:rPr lang="en-US" sz="1600" dirty="0">
+                <a:solidFill>
+                  <a:srgbClr val="AA0000"/>
+                </a:solidFill>
+                <a:latin typeface="Courier" pitchFamily="2" charset="0"/>
+              </a:rPr>
+              <a:t>}</a:t>
+            </a:r>
+            <a:r>
+              <a:rPr lang="en-US" sz="1600" dirty="0">
+                <a:solidFill>
+                  <a:srgbClr val="CC3300"/>
+                </a:solidFill>
+                <a:latin typeface="Courier" pitchFamily="2" charset="0"/>
+              </a:rPr>
+              <a:t>. in I/O - promise`</a:t>
+            </a:r>
+            <a:r>
+              <a:rPr lang="en-US" sz="1600" dirty="0">
+                <a:latin typeface="Courier" pitchFamily="2" charset="0"/>
+              </a:rPr>
+              <a:t>));</a:t>
+            </a:r>
+          </a:p>
+          <a:p>
+            <a:r>
+              <a:rPr lang="en-US" sz="1600" dirty="0">
+                <a:latin typeface="Courier" pitchFamily="2" charset="0"/>
+              </a:rPr>
+              <a:t>});</a:t>
+            </a:r>
+            <a:endParaRPr lang="en-US" sz="1600" dirty="0">
+              <a:effectLst/>
+              <a:latin typeface="Courier" pitchFamily="2" charset="0"/>
+            </a:endParaRPr>
           </a:p>
         </p:txBody>
       </p:sp>
     </p:spTree>
     <p:extLst>
       <p:ext uri="{BB962C8B-B14F-4D97-AF65-F5344CB8AC3E}">
-        <p14:creationId xmlns:p14="http://schemas.microsoft.com/office/powerpoint/2010/main" val="323120263"/>
+        <p14:creationId xmlns:p14="http://schemas.microsoft.com/office/powerpoint/2010/main" val="3319906999"/>
       </p:ext>
     </p:extLst>
   </p:cSld>
@@ -5601,6 +5504,248 @@
       </p:grpSpPr>
       <p:sp>
         <p:nvSpPr>
+          <p:cNvPr id="4" name="TextBox 3">
+            <a:extLst>
+              <a:ext uri="{FF2B5EF4-FFF2-40B4-BE49-F238E27FC236}">
+                <a16:creationId xmlns:a16="http://schemas.microsoft.com/office/drawing/2014/main" id="{4481B8D7-60EA-C540-82E5-252FE3C62AFB}"/>
+              </a:ext>
+            </a:extLst>
+          </p:cNvPr>
+          <p:cNvSpPr txBox="1"/>
+          <p:nvPr/>
+        </p:nvSpPr>
+        <p:spPr>
+          <a:xfrm>
+            <a:off x="1429406" y="693683"/>
+            <a:ext cx="4410561" cy="4801314"/>
+          </a:xfrm>
+          <a:prstGeom prst="rect">
+            <a:avLst/>
+          </a:prstGeom>
+          <a:noFill/>
+          <a:ln>
+            <a:noFill/>
+          </a:ln>
+        </p:spPr>
+        <p:txBody>
+          <a:bodyPr wrap="square" rtlCol="0">
+            <a:spAutoFit/>
+          </a:bodyPr>
+          <a:lstStyle/>
+          <a:p>
+            <a:r>
+              <a:rPr lang="en-US" dirty="0">
+                <a:solidFill>
+                  <a:srgbClr val="0070C0"/>
+                </a:solidFill>
+              </a:rPr>
+              <a:t>Loop 1</a:t>
+            </a:r>
+          </a:p>
+          <a:p>
+            <a:r>
+              <a:rPr lang="en-US" dirty="0"/>
+              <a:t>	timers -</a:t>
+            </a:r>
+            <a:endParaRPr lang="en-US" b="1" dirty="0"/>
+          </a:p>
+          <a:p>
+            <a:r>
+              <a:rPr lang="en-US" dirty="0"/>
+              <a:t>	poll -</a:t>
+            </a:r>
+          </a:p>
+          <a:p>
+            <a:r>
+              <a:rPr lang="en-US" dirty="0"/>
+              <a:t>	check – </a:t>
+            </a:r>
+          </a:p>
+          <a:p>
+            <a:endParaRPr lang="en-US" dirty="0">
+              <a:solidFill>
+                <a:srgbClr val="0070C0"/>
+              </a:solidFill>
+            </a:endParaRPr>
+          </a:p>
+          <a:p>
+            <a:r>
+              <a:rPr lang="en-US" dirty="0">
+                <a:solidFill>
+                  <a:srgbClr val="0070C0"/>
+                </a:solidFill>
+              </a:rPr>
+              <a:t>Loop 2</a:t>
+            </a:r>
+          </a:p>
+          <a:p>
+            <a:r>
+              <a:rPr lang="en-US" dirty="0"/>
+              <a:t>	timers – </a:t>
+            </a:r>
+          </a:p>
+          <a:p>
+            <a:r>
+              <a:rPr lang="en-US" dirty="0"/>
+              <a:t>	poll – </a:t>
+            </a:r>
+            <a:r>
+              <a:rPr lang="en-US" dirty="0" err="1">
+                <a:solidFill>
+                  <a:srgbClr val="FF0000"/>
+                </a:solidFill>
+              </a:rPr>
+              <a:t>readFile</a:t>
+            </a:r>
+            <a:endParaRPr lang="en-US" dirty="0">
+              <a:solidFill>
+                <a:srgbClr val="FF0000"/>
+              </a:solidFill>
+            </a:endParaRPr>
+          </a:p>
+          <a:p>
+            <a:r>
+              <a:rPr lang="en-US" dirty="0"/>
+              <a:t>		</a:t>
+            </a:r>
+            <a:r>
+              <a:rPr lang="en-US" dirty="0">
+                <a:sym typeface="Wingdings" pitchFamily="2" charset="2"/>
+              </a:rPr>
+              <a:t> </a:t>
+            </a:r>
+            <a:r>
+              <a:rPr lang="en-US" dirty="0" err="1">
+                <a:solidFill>
+                  <a:srgbClr val="FF0000"/>
+                </a:solidFill>
+              </a:rPr>
+              <a:t>nextTick</a:t>
+            </a:r>
+            <a:r>
+              <a:rPr lang="en-US" dirty="0">
+                <a:solidFill>
+                  <a:srgbClr val="FF0000"/>
+                </a:solidFill>
+              </a:rPr>
+              <a:t> queue</a:t>
+            </a:r>
+          </a:p>
+          <a:p>
+            <a:r>
+              <a:rPr lang="en-US" dirty="0"/>
+              <a:t>	 	</a:t>
+            </a:r>
+            <a:r>
+              <a:rPr lang="en-US" dirty="0">
+                <a:sym typeface="Wingdings" pitchFamily="2" charset="2"/>
+              </a:rPr>
+              <a:t> </a:t>
+            </a:r>
+            <a:r>
+              <a:rPr lang="en-US" dirty="0">
+                <a:solidFill>
+                  <a:srgbClr val="FF0000"/>
+                </a:solidFill>
+                <a:sym typeface="Wingdings" pitchFamily="2" charset="2"/>
+              </a:rPr>
+              <a:t>promises (</a:t>
+            </a:r>
+            <a:r>
+              <a:rPr lang="en-US" dirty="0">
+                <a:solidFill>
+                  <a:srgbClr val="FF0000"/>
+                </a:solidFill>
+              </a:rPr>
+              <a:t>microtasks queue) </a:t>
+            </a:r>
+          </a:p>
+          <a:p>
+            <a:r>
+              <a:rPr lang="en-US" dirty="0"/>
+              <a:t>	check – our immediate</a:t>
+            </a:r>
+          </a:p>
+          <a:p>
+            <a:endParaRPr lang="en-US" dirty="0">
+              <a:solidFill>
+                <a:srgbClr val="0070C0"/>
+              </a:solidFill>
+            </a:endParaRPr>
+          </a:p>
+          <a:p>
+            <a:r>
+              <a:rPr lang="en-US" dirty="0">
+                <a:solidFill>
+                  <a:srgbClr val="0070C0"/>
+                </a:solidFill>
+              </a:rPr>
+              <a:t>Loop 3 </a:t>
+            </a:r>
+          </a:p>
+          <a:p>
+            <a:r>
+              <a:rPr lang="en-US" dirty="0"/>
+              <a:t>	timers – </a:t>
+            </a:r>
+            <a:r>
+              <a:rPr lang="en-US" dirty="0">
+                <a:solidFill>
+                  <a:srgbClr val="FF0000"/>
+                </a:solidFill>
+              </a:rPr>
+              <a:t>our timeout</a:t>
+            </a:r>
+          </a:p>
+          <a:p>
+            <a:r>
+              <a:rPr lang="en-US" dirty="0"/>
+              <a:t>	poll – </a:t>
+            </a:r>
+          </a:p>
+          <a:p>
+            <a:r>
+              <a:rPr lang="en-US" dirty="0"/>
+              <a:t>	check - </a:t>
+            </a:r>
+          </a:p>
+          <a:p>
+            <a:endParaRPr lang="en-US" dirty="0"/>
+          </a:p>
+        </p:txBody>
+      </p:sp>
+    </p:spTree>
+    <p:extLst>
+      <p:ext uri="{BB962C8B-B14F-4D97-AF65-F5344CB8AC3E}">
+        <p14:creationId xmlns:p14="http://schemas.microsoft.com/office/powerpoint/2010/main" val="323120263"/>
+      </p:ext>
+    </p:extLst>
+  </p:cSld>
+  <p:clrMapOvr>
+    <a:masterClrMapping/>
+  </p:clrMapOvr>
+</p:sld>
+</file>
+
+<file path=ppt/slides/slide16.xml><?xml version="1.0" encoding="utf-8"?>
+<p:sld xmlns:a="http://schemas.openxmlformats.org/drawingml/2006/main" xmlns:r="http://schemas.openxmlformats.org/officeDocument/2006/relationships" xmlns:p="http://schemas.openxmlformats.org/presentationml/2006/main">
+  <p:cSld>
+    <p:spTree>
+      <p:nvGrpSpPr>
+        <p:cNvPr id="1" name=""/>
+        <p:cNvGrpSpPr/>
+        <p:nvPr/>
+      </p:nvGrpSpPr>
+      <p:grpSpPr>
+        <a:xfrm>
+          <a:off x="0" y="0"/>
+          <a:ext cx="0" cy="0"/>
+          <a:chOff x="0" y="0"/>
+          <a:chExt cx="0" cy="0"/>
+        </a:xfrm>
+      </p:grpSpPr>
+      <p:sp>
+        <p:nvSpPr>
           <p:cNvPr id="2" name="Title 1">
             <a:extLst>
               <a:ext uri="{FF2B5EF4-FFF2-40B4-BE49-F238E27FC236}">
@@ -5617,7 +5762,9 @@
         </p:nvSpPr>
         <p:spPr/>
         <p:txBody>
-          <a:bodyPr/>
+          <a:bodyPr>
+            <a:normAutofit fontScale="90000"/>
+          </a:bodyPr>
           <a:lstStyle/>
           <a:p>
             <a:r>
@@ -5632,7 +5779,20 @@
                 <a:latin typeface="Fira Code" panose="020B0509050000020004" pitchFamily="49" charset="0"/>
                 <a:ea typeface="Fira Code" panose="020B0509050000020004" pitchFamily="49" charset="0"/>
               </a:rPr>
-              <a:t> vs. </a:t>
+              <a:t> </a:t>
+            </a:r>
+            <a:br>
+              <a:rPr lang="en-US" dirty="0">
+                <a:latin typeface="Fira Code" panose="020B0509050000020004" pitchFamily="49" charset="0"/>
+                <a:ea typeface="Fira Code" panose="020B0509050000020004" pitchFamily="49" charset="0"/>
+              </a:rPr>
+            </a:br>
+            <a:r>
+              <a:rPr lang="en-US" dirty="0">
+                <a:latin typeface="Fira Code" panose="020B0509050000020004" pitchFamily="49" charset="0"/>
+                <a:ea typeface="Fira Code" panose="020B0509050000020004" pitchFamily="49" charset="0"/>
+              </a:rPr>
+              <a:t>vs. </a:t>
             </a:r>
             <a:r>
               <a:rPr lang="en-US" dirty="0" err="1">
@@ -5641,125 +5801,60 @@
               </a:rPr>
               <a:t>setImmediate</a:t>
             </a:r>
-            <a:endParaRPr lang="en-US" dirty="0">
-              <a:latin typeface="Fira Code" panose="020B0509050000020004" pitchFamily="49" charset="0"/>
-              <a:ea typeface="Fira Code" panose="020B0509050000020004" pitchFamily="49" charset="0"/>
-            </a:endParaRPr>
-          </a:p>
-        </p:txBody>
-      </p:sp>
-      <p:sp>
-        <p:nvSpPr>
-          <p:cNvPr id="3" name="Content Placeholder 2">
-            <a:extLst>
-              <a:ext uri="{FF2B5EF4-FFF2-40B4-BE49-F238E27FC236}">
-                <a16:creationId xmlns:a16="http://schemas.microsoft.com/office/drawing/2014/main" id="{691D2258-1FA7-B345-86AA-CAE0924C7735}"/>
-              </a:ext>
-            </a:extLst>
-          </p:cNvPr>
-          <p:cNvSpPr>
-            <a:spLocks noGrp="1"/>
-          </p:cNvSpPr>
-          <p:nvPr>
-            <p:ph idx="1"/>
-          </p:nvPr>
-        </p:nvSpPr>
-        <p:spPr/>
-        <p:txBody>
-          <a:bodyPr/>
-          <a:lstStyle/>
-          <a:p>
-            <a:r>
-              <a:rPr lang="en-US" dirty="0"/>
-              <a:t>Prefer </a:t>
-            </a:r>
-            <a:r>
-              <a:rPr lang="en-US" dirty="0" err="1">
-                <a:solidFill>
-                  <a:srgbClr val="0070C0"/>
-                </a:solidFill>
+            <a:br>
+              <a:rPr lang="en-US" dirty="0">
                 <a:latin typeface="Fira Code" panose="020B0509050000020004" pitchFamily="49" charset="0"/>
                 <a:ea typeface="Fira Code" panose="020B0509050000020004" pitchFamily="49" charset="0"/>
               </a:rPr>
-              <a:t>setImmediate</a:t>
-            </a:r>
-            <a:r>
-              <a:rPr lang="en-US" dirty="0"/>
-              <a:t> as it’s part of the event loop</a:t>
-            </a:r>
-          </a:p>
-          <a:p>
+            </a:br>
             <a:r>
               <a:rPr lang="en-US" dirty="0">
                 <a:latin typeface="Fira Code" panose="020B0509050000020004" pitchFamily="49" charset="0"/>
                 <a:ea typeface="Fira Code" panose="020B0509050000020004" pitchFamily="49" charset="0"/>
               </a:rPr>
-              <a:t>The </a:t>
+              <a:t>vs. </a:t>
             </a:r>
             <a:r>
               <a:rPr lang="en-US" dirty="0" err="1">
-                <a:solidFill>
-                  <a:srgbClr val="0070C0"/>
-                </a:solidFill>
                 <a:latin typeface="Fira Code" panose="020B0509050000020004" pitchFamily="49" charset="0"/>
                 <a:ea typeface="Fira Code" panose="020B0509050000020004" pitchFamily="49" charset="0"/>
               </a:rPr>
-              <a:t>process.nextTick</a:t>
-            </a:r>
-            <a:r>
-              <a:rPr lang="en-US" dirty="0">
-                <a:solidFill>
-                  <a:srgbClr val="0070C0"/>
-                </a:solidFill>
+              <a:t>Promise.resolve.then</a:t>
+            </a:r>
+            <a:r>
+              <a:rPr lang="en-US" dirty="0">
                 <a:latin typeface="Fira Code" panose="020B0509050000020004" pitchFamily="49" charset="0"/>
                 <a:ea typeface="Fira Code" panose="020B0509050000020004" pitchFamily="49" charset="0"/>
               </a:rPr>
-              <a:t> </a:t>
-            </a:r>
-            <a:r>
-              <a:rPr lang="en-US" dirty="0">
-                <a:ea typeface="Fira Code" panose="020B0509050000020004" pitchFamily="49" charset="0"/>
-              </a:rPr>
-              <a:t>can starve the event loop</a:t>
-            </a:r>
-            <a:endParaRPr lang="en-US" dirty="0"/>
-          </a:p>
-          <a:p>
-            <a:r>
-              <a:rPr lang="en-US" dirty="0">
-                <a:latin typeface="Franklin Gothic Book" panose="020B0503020102020204" pitchFamily="34" charset="0"/>
-                <a:ea typeface="Fira Code" panose="020B0509050000020004" pitchFamily="49" charset="0"/>
-              </a:rPr>
-              <a:t>What about </a:t>
-            </a:r>
-            <a:r>
-              <a:rPr lang="en-US" dirty="0" err="1">
-                <a:solidFill>
-                  <a:srgbClr val="0070C0"/>
-                </a:solidFill>
+              <a:t>()</a:t>
+            </a:r>
+            <a:br>
+              <a:rPr lang="en-US" dirty="0">
                 <a:latin typeface="Fira Code" panose="020B0509050000020004" pitchFamily="49" charset="0"/>
                 <a:ea typeface="Fira Code" panose="020B0509050000020004" pitchFamily="49" charset="0"/>
               </a:rPr>
-              <a:t>Promise.resolve</a:t>
-            </a:r>
-            <a:r>
-              <a:rPr lang="en-US" dirty="0">
-                <a:solidFill>
-                  <a:srgbClr val="0070C0"/>
-                </a:solidFill>
+            </a:br>
+            <a:r>
+              <a:rPr lang="en-US" dirty="0">
                 <a:latin typeface="Fira Code" panose="020B0509050000020004" pitchFamily="49" charset="0"/>
                 <a:ea typeface="Fira Code" panose="020B0509050000020004" pitchFamily="49" charset="0"/>
               </a:rPr>
-              <a:t>().then() </a:t>
-            </a:r>
-            <a:r>
-              <a:rPr lang="en-US" dirty="0">
+              <a:t>vs. </a:t>
+            </a:r>
+            <a:r>
+              <a:rPr lang="en-US" dirty="0" err="1">
                 <a:latin typeface="Fira Code" panose="020B0509050000020004" pitchFamily="49" charset="0"/>
                 <a:ea typeface="Fira Code" panose="020B0509050000020004" pitchFamily="49" charset="0"/>
               </a:rPr>
-              <a:t>?</a:t>
-            </a:r>
-            <a:endParaRPr lang="en-US" dirty="0"/>
+              <a:t>setTimeout</a:t>
+            </a:r>
+            <a:r>
+              <a:rPr lang="en-US" dirty="0">
+                <a:latin typeface="Fira Code" panose="020B0509050000020004" pitchFamily="49" charset="0"/>
+                <a:ea typeface="Fira Code" panose="020B0509050000020004" pitchFamily="49" charset="0"/>
+              </a:rPr>
+              <a:t>()</a:t>
+            </a:r>
           </a:p>
         </p:txBody>
       </p:sp>
@@ -5776,7 +5871,7 @@
 </p:sld>
 </file>
 
-<file path=ppt/slides/slide16.xml><?xml version="1.0" encoding="utf-8"?>
+<file path=ppt/slides/slide17.xml><?xml version="1.0" encoding="utf-8"?>
 <p:sld xmlns:a="http://schemas.openxmlformats.org/drawingml/2006/main" xmlns:r="http://schemas.openxmlformats.org/officeDocument/2006/relationships" xmlns:p="http://schemas.openxmlformats.org/presentationml/2006/main">
   <p:cSld>
     <p:spTree>
@@ -8421,7 +8516,11 @@
               <a:t>	timers – </a:t>
             </a:r>
             <a:r>
-              <a:rPr lang="en-US" b="1" dirty="0"/>
+              <a:rPr lang="en-US" dirty="0">
+                <a:solidFill>
+                  <a:srgbClr val="FF0000"/>
+                </a:solidFill>
+              </a:rPr>
               <a:t>our timeout </a:t>
             </a:r>
           </a:p>
@@ -8434,7 +8533,15 @@
           <a:p>
             <a:r>
               <a:rPr lang="en-US" dirty="0"/>
-              <a:t>	check – our immediate</a:t>
+              <a:t>	check – </a:t>
+            </a:r>
+            <a:r>
+              <a:rPr lang="en-US" dirty="0">
+                <a:solidFill>
+                  <a:srgbClr val="FF0000"/>
+                </a:solidFill>
+              </a:rPr>
+              <a:t>our immediate</a:t>
             </a:r>
           </a:p>
           <a:p>
@@ -8462,10 +8569,18 @@
               <a:t>	poll – </a:t>
             </a:r>
             <a:r>
-              <a:rPr lang="en-US" dirty="0" err="1"/>
+              <a:rPr lang="en-US" dirty="0" err="1">
+                <a:solidFill>
+                  <a:srgbClr val="FF0000"/>
+                </a:solidFill>
+              </a:rPr>
               <a:t>readFile</a:t>
             </a:r>
-            <a:endParaRPr lang="en-US" dirty="0"/>
+            <a:endParaRPr lang="en-US" dirty="0">
+              <a:solidFill>
+                <a:srgbClr val="FF0000"/>
+              </a:solidFill>
+            </a:endParaRPr>
           </a:p>
           <a:p>
             <a:r>
@@ -8544,7 +8659,15 @@
           <a:p>
             <a:r>
               <a:rPr lang="en-US" dirty="0"/>
-              <a:t>	check – our immediate</a:t>
+              <a:t>	check – </a:t>
+            </a:r>
+            <a:r>
+              <a:rPr lang="en-US" dirty="0">
+                <a:solidFill>
+                  <a:srgbClr val="FF0000"/>
+                </a:solidFill>
+              </a:rPr>
+              <a:t>our immediate</a:t>
             </a:r>
           </a:p>
           <a:p>
@@ -8566,7 +8689,11 @@
               <a:t>	timers – </a:t>
             </a:r>
             <a:r>
-              <a:rPr lang="en-US" b="1" dirty="0"/>
+              <a:rPr lang="en-US" dirty="0">
+                <a:solidFill>
+                  <a:srgbClr val="FF0000"/>
+                </a:solidFill>
+              </a:rPr>
               <a:t>our timeout </a:t>
             </a:r>
           </a:p>
@@ -8576,10 +8703,18 @@
               <a:t>	poll – </a:t>
             </a:r>
             <a:r>
-              <a:rPr lang="en-US" dirty="0" err="1"/>
+              <a:rPr lang="en-US" dirty="0" err="1">
+                <a:solidFill>
+                  <a:srgbClr val="FF0000"/>
+                </a:solidFill>
+              </a:rPr>
               <a:t>readFile</a:t>
             </a:r>
-            <a:endParaRPr lang="en-US" dirty="0"/>
+            <a:endParaRPr lang="en-US" dirty="0">
+              <a:solidFill>
+                <a:srgbClr val="FF0000"/>
+              </a:solidFill>
+            </a:endParaRPr>
           </a:p>
           <a:p>
             <a:r>

</xml_diff>